<commit_message>
Eliminado Capgemini y cambios en ppt
</commit_message>
<xml_diff>
--- a/Kata Roman-Decimal.pptx
+++ b/Kata Roman-Decimal.pptx
@@ -6,10 +6,10 @@
     <p:sldMasterId id="2147483671" r:id="rId5"/>
   </p:sldMasterIdLst>
   <p:notesMasterIdLst>
-    <p:notesMasterId r:id="rId17"/>
+    <p:notesMasterId r:id="rId18"/>
   </p:notesMasterIdLst>
   <p:handoutMasterIdLst>
-    <p:handoutMasterId r:id="rId18"/>
+    <p:handoutMasterId r:id="rId19"/>
   </p:handoutMasterIdLst>
   <p:sldIdLst>
     <p:sldId id="538" r:id="rId6"/>
@@ -17,12 +17,13 @@
     <p:sldId id="562" r:id="rId8"/>
     <p:sldId id="577" r:id="rId9"/>
     <p:sldId id="571" r:id="rId10"/>
-    <p:sldId id="572" r:id="rId11"/>
-    <p:sldId id="578" r:id="rId12"/>
-    <p:sldId id="580" r:id="rId13"/>
-    <p:sldId id="275" r:id="rId14"/>
-    <p:sldId id="579" r:id="rId15"/>
-    <p:sldId id="557" r:id="rId16"/>
+    <p:sldId id="576" r:id="rId11"/>
+    <p:sldId id="572" r:id="rId12"/>
+    <p:sldId id="578" r:id="rId13"/>
+    <p:sldId id="580" r:id="rId14"/>
+    <p:sldId id="275" r:id="rId15"/>
+    <p:sldId id="579" r:id="rId16"/>
+    <p:sldId id="557" r:id="rId17"/>
   </p:sldIdLst>
   <p:sldSz cx="12192000" cy="6858000"/>
   <p:notesSz cx="6858000" cy="9144000"/>
@@ -153,248 +154,6 @@
 
 <file path=ppt/changesInfos/changesInfo1.xml><?xml version="1.0" encoding="utf-8"?>
 <pc:chgInfo xmlns:a="http://schemas.openxmlformats.org/drawingml/2006/main" xmlns:r="http://schemas.openxmlformats.org/officeDocument/2006/relationships" xmlns:ac="http://schemas.microsoft.com/office/drawing/2013/main/command" xmlns:pc="http://schemas.microsoft.com/office/powerpoint/2013/main/command">
-  <pc:docChgLst>
-    <pc:chgData name="Jimenez Martinez, Pablo" userId="713675c2-bab4-4c20-ae51-6cb24299fdbd" providerId="ADAL" clId="{CB2CE608-4B17-4114-A01E-68AB8ADD06B6}"/>
-    <pc:docChg chg="undo custSel addSld delSld modSld">
-      <pc:chgData name="Jimenez Martinez, Pablo" userId="713675c2-bab4-4c20-ae51-6cb24299fdbd" providerId="ADAL" clId="{CB2CE608-4B17-4114-A01E-68AB8ADD06B6}" dt="2022-03-24T07:24:16.772" v="790" actId="47"/>
-      <pc:docMkLst>
-        <pc:docMk/>
-      </pc:docMkLst>
-      <pc:sldChg chg="modSp add mod">
-        <pc:chgData name="Jimenez Martinez, Pablo" userId="713675c2-bab4-4c20-ae51-6cb24299fdbd" providerId="ADAL" clId="{CB2CE608-4B17-4114-A01E-68AB8ADD06B6}" dt="2022-03-23T11:49:21.690" v="88" actId="1035"/>
-        <pc:sldMkLst>
-          <pc:docMk/>
-          <pc:sldMk cId="0" sldId="275"/>
-        </pc:sldMkLst>
-        <pc:spChg chg="mod">
-          <ac:chgData name="Jimenez Martinez, Pablo" userId="713675c2-bab4-4c20-ae51-6cb24299fdbd" providerId="ADAL" clId="{CB2CE608-4B17-4114-A01E-68AB8ADD06B6}" dt="2022-03-23T11:49:21.042" v="87" actId="1036"/>
-          <ac:spMkLst>
-            <pc:docMk/>
-            <pc:sldMk cId="0" sldId="275"/>
-            <ac:spMk id="196" creationId="{00000000-0000-0000-0000-000000000000}"/>
-          </ac:spMkLst>
-        </pc:spChg>
-        <pc:picChg chg="mod">
-          <ac:chgData name="Jimenez Martinez, Pablo" userId="713675c2-bab4-4c20-ae51-6cb24299fdbd" providerId="ADAL" clId="{CB2CE608-4B17-4114-A01E-68AB8ADD06B6}" dt="2022-03-23T11:49:21.690" v="88" actId="1035"/>
-          <ac:picMkLst>
-            <pc:docMk/>
-            <pc:sldMk cId="0" sldId="275"/>
-            <ac:picMk id="4098" creationId="{00000000-0000-0000-0000-000000000000}"/>
-          </ac:picMkLst>
-        </pc:picChg>
-      </pc:sldChg>
-      <pc:sldChg chg="modSp add mod">
-        <pc:chgData name="Jimenez Martinez, Pablo" userId="713675c2-bab4-4c20-ae51-6cb24299fdbd" providerId="ADAL" clId="{CB2CE608-4B17-4114-A01E-68AB8ADD06B6}" dt="2022-03-23T11:57:30.180" v="415" actId="20577"/>
-        <pc:sldMkLst>
-          <pc:docMk/>
-          <pc:sldMk cId="2871526943" sldId="276"/>
-        </pc:sldMkLst>
-        <pc:spChg chg="mod">
-          <ac:chgData name="Jimenez Martinez, Pablo" userId="713675c2-bab4-4c20-ae51-6cb24299fdbd" providerId="ADAL" clId="{CB2CE608-4B17-4114-A01E-68AB8ADD06B6}" dt="2022-03-23T11:57:30.180" v="415" actId="20577"/>
-          <ac:spMkLst>
-            <pc:docMk/>
-            <pc:sldMk cId="2871526943" sldId="276"/>
-            <ac:spMk id="196" creationId="{00000000-0000-0000-0000-000000000000}"/>
-          </ac:spMkLst>
-        </pc:spChg>
-      </pc:sldChg>
-      <pc:sldChg chg="modSp add mod">
-        <pc:chgData name="Jimenez Martinez, Pablo" userId="713675c2-bab4-4c20-ae51-6cb24299fdbd" providerId="ADAL" clId="{CB2CE608-4B17-4114-A01E-68AB8ADD06B6}" dt="2022-03-23T15:31:01.066" v="785" actId="1035"/>
-        <pc:sldMkLst>
-          <pc:docMk/>
-          <pc:sldMk cId="469566384" sldId="277"/>
-        </pc:sldMkLst>
-        <pc:spChg chg="mod">
-          <ac:chgData name="Jimenez Martinez, Pablo" userId="713675c2-bab4-4c20-ae51-6cb24299fdbd" providerId="ADAL" clId="{CB2CE608-4B17-4114-A01E-68AB8ADD06B6}" dt="2022-03-23T15:30:55.260" v="778" actId="6549"/>
-          <ac:spMkLst>
-            <pc:docMk/>
-            <pc:sldMk cId="469566384" sldId="277"/>
-            <ac:spMk id="196" creationId="{00000000-0000-0000-0000-000000000000}"/>
-          </ac:spMkLst>
-        </pc:spChg>
-        <pc:picChg chg="mod">
-          <ac:chgData name="Jimenez Martinez, Pablo" userId="713675c2-bab4-4c20-ae51-6cb24299fdbd" providerId="ADAL" clId="{CB2CE608-4B17-4114-A01E-68AB8ADD06B6}" dt="2022-03-23T15:31:01.066" v="785" actId="1035"/>
-          <ac:picMkLst>
-            <pc:docMk/>
-            <pc:sldMk cId="469566384" sldId="277"/>
-            <ac:picMk id="2050" creationId="{00000000-0000-0000-0000-000000000000}"/>
-          </ac:picMkLst>
-        </pc:picChg>
-      </pc:sldChg>
-      <pc:sldChg chg="modSp add mod">
-        <pc:chgData name="Jimenez Martinez, Pablo" userId="713675c2-bab4-4c20-ae51-6cb24299fdbd" providerId="ADAL" clId="{CB2CE608-4B17-4114-A01E-68AB8ADD06B6}" dt="2022-03-23T11:58:35.728" v="461" actId="6549"/>
-        <pc:sldMkLst>
-          <pc:docMk/>
-          <pc:sldMk cId="223235735" sldId="278"/>
-        </pc:sldMkLst>
-        <pc:spChg chg="mod">
-          <ac:chgData name="Jimenez Martinez, Pablo" userId="713675c2-bab4-4c20-ae51-6cb24299fdbd" providerId="ADAL" clId="{CB2CE608-4B17-4114-A01E-68AB8ADD06B6}" dt="2022-03-23T11:58:35.728" v="461" actId="6549"/>
-          <ac:spMkLst>
-            <pc:docMk/>
-            <pc:sldMk cId="223235735" sldId="278"/>
-            <ac:spMk id="196" creationId="{00000000-0000-0000-0000-000000000000}"/>
-          </ac:spMkLst>
-        </pc:spChg>
-      </pc:sldChg>
-      <pc:sldChg chg="addSp modSp del mod">
-        <pc:chgData name="Jimenez Martinez, Pablo" userId="713675c2-bab4-4c20-ae51-6cb24299fdbd" providerId="ADAL" clId="{CB2CE608-4B17-4114-A01E-68AB8ADD06B6}" dt="2022-03-24T07:24:16.772" v="790" actId="47"/>
-        <pc:sldMkLst>
-          <pc:docMk/>
-          <pc:sldMk cId="3138233843" sldId="296"/>
-        </pc:sldMkLst>
-        <pc:spChg chg="add mod">
-          <ac:chgData name="Jimenez Martinez, Pablo" userId="713675c2-bab4-4c20-ae51-6cb24299fdbd" providerId="ADAL" clId="{CB2CE608-4B17-4114-A01E-68AB8ADD06B6}" dt="2022-03-23T12:02:43.024" v="767" actId="1076"/>
-          <ac:spMkLst>
-            <pc:docMk/>
-            <pc:sldMk cId="3138233843" sldId="296"/>
-            <ac:spMk id="3" creationId="{697D6FE8-8B49-4650-8D14-860460D492B4}"/>
-          </ac:spMkLst>
-        </pc:spChg>
-      </pc:sldChg>
-      <pc:sldChg chg="delSp modSp mod">
-        <pc:chgData name="Jimenez Martinez, Pablo" userId="713675c2-bab4-4c20-ae51-6cb24299fdbd" providerId="ADAL" clId="{CB2CE608-4B17-4114-A01E-68AB8ADD06B6}" dt="2022-03-23T11:48:20.895" v="52" actId="1038"/>
-        <pc:sldMkLst>
-          <pc:docMk/>
-          <pc:sldMk cId="1068206032" sldId="538"/>
-        </pc:sldMkLst>
-        <pc:spChg chg="mod">
-          <ac:chgData name="Jimenez Martinez, Pablo" userId="713675c2-bab4-4c20-ae51-6cb24299fdbd" providerId="ADAL" clId="{CB2CE608-4B17-4114-A01E-68AB8ADD06B6}" dt="2022-03-23T11:48:05.250" v="30" actId="20577"/>
-          <ac:spMkLst>
-            <pc:docMk/>
-            <pc:sldMk cId="1068206032" sldId="538"/>
-            <ac:spMk id="5" creationId="{CDAD4CD6-0D42-4B53-A553-167F9F359564}"/>
-          </ac:spMkLst>
-        </pc:spChg>
-        <pc:spChg chg="mod">
-          <ac:chgData name="Jimenez Martinez, Pablo" userId="713675c2-bab4-4c20-ae51-6cb24299fdbd" providerId="ADAL" clId="{CB2CE608-4B17-4114-A01E-68AB8ADD06B6}" dt="2022-03-23T11:48:20.895" v="52" actId="1038"/>
-          <ac:spMkLst>
-            <pc:docMk/>
-            <pc:sldMk cId="1068206032" sldId="538"/>
-            <ac:spMk id="6" creationId="{A7836B60-AE10-4694-B8D8-4190ECFD8ED2}"/>
-          </ac:spMkLst>
-        </pc:spChg>
-        <pc:spChg chg="del">
-          <ac:chgData name="Jimenez Martinez, Pablo" userId="713675c2-bab4-4c20-ae51-6cb24299fdbd" providerId="ADAL" clId="{CB2CE608-4B17-4114-A01E-68AB8ADD06B6}" dt="2022-03-23T11:48:13.913" v="42" actId="478"/>
-          <ac:spMkLst>
-            <pc:docMk/>
-            <pc:sldMk cId="1068206032" sldId="538"/>
-            <ac:spMk id="8" creationId="{80A9FC94-A316-4D8B-818F-7CDE09F8747C}"/>
-          </ac:spMkLst>
-        </pc:spChg>
-      </pc:sldChg>
-      <pc:sldChg chg="del">
-        <pc:chgData name="Jimenez Martinez, Pablo" userId="713675c2-bab4-4c20-ae51-6cb24299fdbd" providerId="ADAL" clId="{CB2CE608-4B17-4114-A01E-68AB8ADD06B6}" dt="2022-03-23T11:49:24.987" v="89" actId="47"/>
-        <pc:sldMkLst>
-          <pc:docMk/>
-          <pc:sldMk cId="3614825301" sldId="558"/>
-        </pc:sldMkLst>
-      </pc:sldChg>
-      <pc:sldChg chg="del">
-        <pc:chgData name="Jimenez Martinez, Pablo" userId="713675c2-bab4-4c20-ae51-6cb24299fdbd" providerId="ADAL" clId="{CB2CE608-4B17-4114-A01E-68AB8ADD06B6}" dt="2022-03-23T11:49:27.997" v="91" actId="47"/>
-        <pc:sldMkLst>
-          <pc:docMk/>
-          <pc:sldMk cId="223235735" sldId="559"/>
-        </pc:sldMkLst>
-      </pc:sldChg>
-      <pc:sldChg chg="modSp mod">
-        <pc:chgData name="Jimenez Martinez, Pablo" userId="713675c2-bab4-4c20-ae51-6cb24299fdbd" providerId="ADAL" clId="{CB2CE608-4B17-4114-A01E-68AB8ADD06B6}" dt="2022-03-23T11:48:47.066" v="65" actId="6549"/>
-        <pc:sldMkLst>
-          <pc:docMk/>
-          <pc:sldMk cId="2773007854" sldId="572"/>
-        </pc:sldMkLst>
-        <pc:spChg chg="mod">
-          <ac:chgData name="Jimenez Martinez, Pablo" userId="713675c2-bab4-4c20-ae51-6cb24299fdbd" providerId="ADAL" clId="{CB2CE608-4B17-4114-A01E-68AB8ADD06B6}" dt="2022-03-23T11:48:47.066" v="65" actId="6549"/>
-          <ac:spMkLst>
-            <pc:docMk/>
-            <pc:sldMk cId="2773007854" sldId="572"/>
-            <ac:spMk id="6" creationId="{0BB40221-4A4C-4967-A2D2-883873C2B121}"/>
-          </ac:spMkLst>
-        </pc:spChg>
-      </pc:sldChg>
-      <pc:sldChg chg="modSp mod">
-        <pc:chgData name="Jimenez Martinez, Pablo" userId="713675c2-bab4-4c20-ae51-6cb24299fdbd" providerId="ADAL" clId="{CB2CE608-4B17-4114-A01E-68AB8ADD06B6}" dt="2022-03-23T12:01:20.458" v="709" actId="6549"/>
-        <pc:sldMkLst>
-          <pc:docMk/>
-          <pc:sldMk cId="4068828634" sldId="573"/>
-        </pc:sldMkLst>
-        <pc:spChg chg="mod">
-          <ac:chgData name="Jimenez Martinez, Pablo" userId="713675c2-bab4-4c20-ae51-6cb24299fdbd" providerId="ADAL" clId="{CB2CE608-4B17-4114-A01E-68AB8ADD06B6}" dt="2022-03-23T12:01:20.458" v="709" actId="6549"/>
-          <ac:spMkLst>
-            <pc:docMk/>
-            <pc:sldMk cId="4068828634" sldId="573"/>
-            <ac:spMk id="170" creationId="{00000000-0000-0000-0000-000000000000}"/>
-          </ac:spMkLst>
-        </pc:spChg>
-      </pc:sldChg>
-      <pc:sldChg chg="del">
-        <pc:chgData name="Jimenez Martinez, Pablo" userId="713675c2-bab4-4c20-ae51-6cb24299fdbd" providerId="ADAL" clId="{CB2CE608-4B17-4114-A01E-68AB8ADD06B6}" dt="2022-03-23T11:49:26.789" v="90" actId="47"/>
-        <pc:sldMkLst>
-          <pc:docMk/>
-          <pc:sldMk cId="3070921349" sldId="578"/>
-        </pc:sldMkLst>
-      </pc:sldChg>
-      <pc:sldChg chg="addSp modSp del">
-        <pc:chgData name="Jimenez Martinez, Pablo" userId="713675c2-bab4-4c20-ae51-6cb24299fdbd" providerId="ADAL" clId="{CB2CE608-4B17-4114-A01E-68AB8ADD06B6}" dt="2022-03-24T07:24:15.652" v="789" actId="47"/>
-        <pc:sldMkLst>
-          <pc:docMk/>
-          <pc:sldMk cId="1943026793" sldId="581"/>
-        </pc:sldMkLst>
-        <pc:spChg chg="add mod">
-          <ac:chgData name="Jimenez Martinez, Pablo" userId="713675c2-bab4-4c20-ae51-6cb24299fdbd" providerId="ADAL" clId="{CB2CE608-4B17-4114-A01E-68AB8ADD06B6}" dt="2022-03-23T12:02:47.101" v="768"/>
-          <ac:spMkLst>
-            <pc:docMk/>
-            <pc:sldMk cId="1943026793" sldId="581"/>
-            <ac:spMk id="16" creationId="{0A1EC8A3-A9CF-43C2-B191-FEC0FC5CC2C8}"/>
-          </ac:spMkLst>
-        </pc:spChg>
-      </pc:sldChg>
-      <pc:sldChg chg="addSp modSp del">
-        <pc:chgData name="Jimenez Martinez, Pablo" userId="713675c2-bab4-4c20-ae51-6cb24299fdbd" providerId="ADAL" clId="{CB2CE608-4B17-4114-A01E-68AB8ADD06B6}" dt="2022-03-24T07:24:14.836" v="788" actId="47"/>
-        <pc:sldMkLst>
-          <pc:docMk/>
-          <pc:sldMk cId="2227367454" sldId="583"/>
-        </pc:sldMkLst>
-        <pc:spChg chg="add mod">
-          <ac:chgData name="Jimenez Martinez, Pablo" userId="713675c2-bab4-4c20-ae51-6cb24299fdbd" providerId="ADAL" clId="{CB2CE608-4B17-4114-A01E-68AB8ADD06B6}" dt="2022-03-23T12:02:53.465" v="769"/>
-          <ac:spMkLst>
-            <pc:docMk/>
-            <pc:sldMk cId="2227367454" sldId="583"/>
-            <ac:spMk id="15" creationId="{F0C24E1F-20DD-448D-A403-12D6BF573BB8}"/>
-          </ac:spMkLst>
-        </pc:spChg>
-      </pc:sldChg>
-      <pc:sldChg chg="addSp modSp del">
-        <pc:chgData name="Jimenez Martinez, Pablo" userId="713675c2-bab4-4c20-ae51-6cb24299fdbd" providerId="ADAL" clId="{CB2CE608-4B17-4114-A01E-68AB8ADD06B6}" dt="2022-03-24T07:24:13.438" v="787" actId="47"/>
-        <pc:sldMkLst>
-          <pc:docMk/>
-          <pc:sldMk cId="833658107" sldId="584"/>
-        </pc:sldMkLst>
-        <pc:spChg chg="add mod">
-          <ac:chgData name="Jimenez Martinez, Pablo" userId="713675c2-bab4-4c20-ae51-6cb24299fdbd" providerId="ADAL" clId="{CB2CE608-4B17-4114-A01E-68AB8ADD06B6}" dt="2022-03-23T12:03:08.692" v="770"/>
-          <ac:spMkLst>
-            <pc:docMk/>
-            <pc:sldMk cId="833658107" sldId="584"/>
-            <ac:spMk id="21" creationId="{CB71DEBF-3C4B-427D-9AC4-62AA3625412B}"/>
-          </ac:spMkLst>
-        </pc:spChg>
-      </pc:sldChg>
-      <pc:sldChg chg="addSp modSp del">
-        <pc:chgData name="Jimenez Martinez, Pablo" userId="713675c2-bab4-4c20-ae51-6cb24299fdbd" providerId="ADAL" clId="{CB2CE608-4B17-4114-A01E-68AB8ADD06B6}" dt="2022-03-24T07:24:12.524" v="786" actId="47"/>
-        <pc:sldMkLst>
-          <pc:docMk/>
-          <pc:sldMk cId="3454759851" sldId="585"/>
-        </pc:sldMkLst>
-        <pc:spChg chg="add mod">
-          <ac:chgData name="Jimenez Martinez, Pablo" userId="713675c2-bab4-4c20-ae51-6cb24299fdbd" providerId="ADAL" clId="{CB2CE608-4B17-4114-A01E-68AB8ADD06B6}" dt="2022-03-23T12:03:11.855" v="771"/>
-          <ac:spMkLst>
-            <pc:docMk/>
-            <pc:sldMk cId="3454759851" sldId="585"/>
-            <ac:spMk id="15" creationId="{D2E11DD3-BA8F-409C-B3CF-ABE1F7115330}"/>
-          </ac:spMkLst>
-        </pc:spChg>
-      </pc:sldChg>
-    </pc:docChg>
-  </pc:docChgLst>
   <pc:docChgLst>
     <pc:chgData name="Jimenez Martinez, Pablo" userId="713675c2-bab4-4c20-ae51-6cb24299fdbd" providerId="ADAL" clId="{ACF71593-2CE1-4585-8D7A-E6DB649D4B39}"/>
     <pc:docChg chg="undo custSel addSld delSld modSld">
@@ -913,6 +672,248 @@
       </pc:sldChg>
     </pc:docChg>
   </pc:docChgLst>
+  <pc:docChgLst>
+    <pc:chgData name="Jimenez Martinez, Pablo" userId="713675c2-bab4-4c20-ae51-6cb24299fdbd" providerId="ADAL" clId="{CB2CE608-4B17-4114-A01E-68AB8ADD06B6}"/>
+    <pc:docChg chg="undo custSel addSld delSld modSld">
+      <pc:chgData name="Jimenez Martinez, Pablo" userId="713675c2-bab4-4c20-ae51-6cb24299fdbd" providerId="ADAL" clId="{CB2CE608-4B17-4114-A01E-68AB8ADD06B6}" dt="2022-03-24T07:24:16.772" v="790" actId="47"/>
+      <pc:docMkLst>
+        <pc:docMk/>
+      </pc:docMkLst>
+      <pc:sldChg chg="modSp add mod">
+        <pc:chgData name="Jimenez Martinez, Pablo" userId="713675c2-bab4-4c20-ae51-6cb24299fdbd" providerId="ADAL" clId="{CB2CE608-4B17-4114-A01E-68AB8ADD06B6}" dt="2022-03-23T11:49:21.690" v="88" actId="1035"/>
+        <pc:sldMkLst>
+          <pc:docMk/>
+          <pc:sldMk cId="0" sldId="275"/>
+        </pc:sldMkLst>
+        <pc:spChg chg="mod">
+          <ac:chgData name="Jimenez Martinez, Pablo" userId="713675c2-bab4-4c20-ae51-6cb24299fdbd" providerId="ADAL" clId="{CB2CE608-4B17-4114-A01E-68AB8ADD06B6}" dt="2022-03-23T11:49:21.042" v="87" actId="1036"/>
+          <ac:spMkLst>
+            <pc:docMk/>
+            <pc:sldMk cId="0" sldId="275"/>
+            <ac:spMk id="196" creationId="{00000000-0000-0000-0000-000000000000}"/>
+          </ac:spMkLst>
+        </pc:spChg>
+        <pc:picChg chg="mod">
+          <ac:chgData name="Jimenez Martinez, Pablo" userId="713675c2-bab4-4c20-ae51-6cb24299fdbd" providerId="ADAL" clId="{CB2CE608-4B17-4114-A01E-68AB8ADD06B6}" dt="2022-03-23T11:49:21.690" v="88" actId="1035"/>
+          <ac:picMkLst>
+            <pc:docMk/>
+            <pc:sldMk cId="0" sldId="275"/>
+            <ac:picMk id="4098" creationId="{00000000-0000-0000-0000-000000000000}"/>
+          </ac:picMkLst>
+        </pc:picChg>
+      </pc:sldChg>
+      <pc:sldChg chg="modSp add mod">
+        <pc:chgData name="Jimenez Martinez, Pablo" userId="713675c2-bab4-4c20-ae51-6cb24299fdbd" providerId="ADAL" clId="{CB2CE608-4B17-4114-A01E-68AB8ADD06B6}" dt="2022-03-23T11:57:30.180" v="415" actId="20577"/>
+        <pc:sldMkLst>
+          <pc:docMk/>
+          <pc:sldMk cId="2871526943" sldId="276"/>
+        </pc:sldMkLst>
+        <pc:spChg chg="mod">
+          <ac:chgData name="Jimenez Martinez, Pablo" userId="713675c2-bab4-4c20-ae51-6cb24299fdbd" providerId="ADAL" clId="{CB2CE608-4B17-4114-A01E-68AB8ADD06B6}" dt="2022-03-23T11:57:30.180" v="415" actId="20577"/>
+          <ac:spMkLst>
+            <pc:docMk/>
+            <pc:sldMk cId="2871526943" sldId="276"/>
+            <ac:spMk id="196" creationId="{00000000-0000-0000-0000-000000000000}"/>
+          </ac:spMkLst>
+        </pc:spChg>
+      </pc:sldChg>
+      <pc:sldChg chg="modSp add mod">
+        <pc:chgData name="Jimenez Martinez, Pablo" userId="713675c2-bab4-4c20-ae51-6cb24299fdbd" providerId="ADAL" clId="{CB2CE608-4B17-4114-A01E-68AB8ADD06B6}" dt="2022-03-23T15:31:01.066" v="785" actId="1035"/>
+        <pc:sldMkLst>
+          <pc:docMk/>
+          <pc:sldMk cId="469566384" sldId="277"/>
+        </pc:sldMkLst>
+        <pc:spChg chg="mod">
+          <ac:chgData name="Jimenez Martinez, Pablo" userId="713675c2-bab4-4c20-ae51-6cb24299fdbd" providerId="ADAL" clId="{CB2CE608-4B17-4114-A01E-68AB8ADD06B6}" dt="2022-03-23T15:30:55.260" v="778" actId="6549"/>
+          <ac:spMkLst>
+            <pc:docMk/>
+            <pc:sldMk cId="469566384" sldId="277"/>
+            <ac:spMk id="196" creationId="{00000000-0000-0000-0000-000000000000}"/>
+          </ac:spMkLst>
+        </pc:spChg>
+        <pc:picChg chg="mod">
+          <ac:chgData name="Jimenez Martinez, Pablo" userId="713675c2-bab4-4c20-ae51-6cb24299fdbd" providerId="ADAL" clId="{CB2CE608-4B17-4114-A01E-68AB8ADD06B6}" dt="2022-03-23T15:31:01.066" v="785" actId="1035"/>
+          <ac:picMkLst>
+            <pc:docMk/>
+            <pc:sldMk cId="469566384" sldId="277"/>
+            <ac:picMk id="2050" creationId="{00000000-0000-0000-0000-000000000000}"/>
+          </ac:picMkLst>
+        </pc:picChg>
+      </pc:sldChg>
+      <pc:sldChg chg="modSp add mod">
+        <pc:chgData name="Jimenez Martinez, Pablo" userId="713675c2-bab4-4c20-ae51-6cb24299fdbd" providerId="ADAL" clId="{CB2CE608-4B17-4114-A01E-68AB8ADD06B6}" dt="2022-03-23T11:58:35.728" v="461" actId="6549"/>
+        <pc:sldMkLst>
+          <pc:docMk/>
+          <pc:sldMk cId="223235735" sldId="278"/>
+        </pc:sldMkLst>
+        <pc:spChg chg="mod">
+          <ac:chgData name="Jimenez Martinez, Pablo" userId="713675c2-bab4-4c20-ae51-6cb24299fdbd" providerId="ADAL" clId="{CB2CE608-4B17-4114-A01E-68AB8ADD06B6}" dt="2022-03-23T11:58:35.728" v="461" actId="6549"/>
+          <ac:spMkLst>
+            <pc:docMk/>
+            <pc:sldMk cId="223235735" sldId="278"/>
+            <ac:spMk id="196" creationId="{00000000-0000-0000-0000-000000000000}"/>
+          </ac:spMkLst>
+        </pc:spChg>
+      </pc:sldChg>
+      <pc:sldChg chg="addSp modSp del mod">
+        <pc:chgData name="Jimenez Martinez, Pablo" userId="713675c2-bab4-4c20-ae51-6cb24299fdbd" providerId="ADAL" clId="{CB2CE608-4B17-4114-A01E-68AB8ADD06B6}" dt="2022-03-24T07:24:16.772" v="790" actId="47"/>
+        <pc:sldMkLst>
+          <pc:docMk/>
+          <pc:sldMk cId="3138233843" sldId="296"/>
+        </pc:sldMkLst>
+        <pc:spChg chg="add mod">
+          <ac:chgData name="Jimenez Martinez, Pablo" userId="713675c2-bab4-4c20-ae51-6cb24299fdbd" providerId="ADAL" clId="{CB2CE608-4B17-4114-A01E-68AB8ADD06B6}" dt="2022-03-23T12:02:43.024" v="767" actId="1076"/>
+          <ac:spMkLst>
+            <pc:docMk/>
+            <pc:sldMk cId="3138233843" sldId="296"/>
+            <ac:spMk id="3" creationId="{697D6FE8-8B49-4650-8D14-860460D492B4}"/>
+          </ac:spMkLst>
+        </pc:spChg>
+      </pc:sldChg>
+      <pc:sldChg chg="delSp modSp mod">
+        <pc:chgData name="Jimenez Martinez, Pablo" userId="713675c2-bab4-4c20-ae51-6cb24299fdbd" providerId="ADAL" clId="{CB2CE608-4B17-4114-A01E-68AB8ADD06B6}" dt="2022-03-23T11:48:20.895" v="52" actId="1038"/>
+        <pc:sldMkLst>
+          <pc:docMk/>
+          <pc:sldMk cId="1068206032" sldId="538"/>
+        </pc:sldMkLst>
+        <pc:spChg chg="mod">
+          <ac:chgData name="Jimenez Martinez, Pablo" userId="713675c2-bab4-4c20-ae51-6cb24299fdbd" providerId="ADAL" clId="{CB2CE608-4B17-4114-A01E-68AB8ADD06B6}" dt="2022-03-23T11:48:05.250" v="30" actId="20577"/>
+          <ac:spMkLst>
+            <pc:docMk/>
+            <pc:sldMk cId="1068206032" sldId="538"/>
+            <ac:spMk id="5" creationId="{CDAD4CD6-0D42-4B53-A553-167F9F359564}"/>
+          </ac:spMkLst>
+        </pc:spChg>
+        <pc:spChg chg="mod">
+          <ac:chgData name="Jimenez Martinez, Pablo" userId="713675c2-bab4-4c20-ae51-6cb24299fdbd" providerId="ADAL" clId="{CB2CE608-4B17-4114-A01E-68AB8ADD06B6}" dt="2022-03-23T11:48:20.895" v="52" actId="1038"/>
+          <ac:spMkLst>
+            <pc:docMk/>
+            <pc:sldMk cId="1068206032" sldId="538"/>
+            <ac:spMk id="6" creationId="{A7836B60-AE10-4694-B8D8-4190ECFD8ED2}"/>
+          </ac:spMkLst>
+        </pc:spChg>
+        <pc:spChg chg="del">
+          <ac:chgData name="Jimenez Martinez, Pablo" userId="713675c2-bab4-4c20-ae51-6cb24299fdbd" providerId="ADAL" clId="{CB2CE608-4B17-4114-A01E-68AB8ADD06B6}" dt="2022-03-23T11:48:13.913" v="42" actId="478"/>
+          <ac:spMkLst>
+            <pc:docMk/>
+            <pc:sldMk cId="1068206032" sldId="538"/>
+            <ac:spMk id="8" creationId="{80A9FC94-A316-4D8B-818F-7CDE09F8747C}"/>
+          </ac:spMkLst>
+        </pc:spChg>
+      </pc:sldChg>
+      <pc:sldChg chg="del">
+        <pc:chgData name="Jimenez Martinez, Pablo" userId="713675c2-bab4-4c20-ae51-6cb24299fdbd" providerId="ADAL" clId="{CB2CE608-4B17-4114-A01E-68AB8ADD06B6}" dt="2022-03-23T11:49:24.987" v="89" actId="47"/>
+        <pc:sldMkLst>
+          <pc:docMk/>
+          <pc:sldMk cId="3614825301" sldId="558"/>
+        </pc:sldMkLst>
+      </pc:sldChg>
+      <pc:sldChg chg="del">
+        <pc:chgData name="Jimenez Martinez, Pablo" userId="713675c2-bab4-4c20-ae51-6cb24299fdbd" providerId="ADAL" clId="{CB2CE608-4B17-4114-A01E-68AB8ADD06B6}" dt="2022-03-23T11:49:27.997" v="91" actId="47"/>
+        <pc:sldMkLst>
+          <pc:docMk/>
+          <pc:sldMk cId="223235735" sldId="559"/>
+        </pc:sldMkLst>
+      </pc:sldChg>
+      <pc:sldChg chg="modSp mod">
+        <pc:chgData name="Jimenez Martinez, Pablo" userId="713675c2-bab4-4c20-ae51-6cb24299fdbd" providerId="ADAL" clId="{CB2CE608-4B17-4114-A01E-68AB8ADD06B6}" dt="2022-03-23T11:48:47.066" v="65" actId="6549"/>
+        <pc:sldMkLst>
+          <pc:docMk/>
+          <pc:sldMk cId="2773007854" sldId="572"/>
+        </pc:sldMkLst>
+        <pc:spChg chg="mod">
+          <ac:chgData name="Jimenez Martinez, Pablo" userId="713675c2-bab4-4c20-ae51-6cb24299fdbd" providerId="ADAL" clId="{CB2CE608-4B17-4114-A01E-68AB8ADD06B6}" dt="2022-03-23T11:48:47.066" v="65" actId="6549"/>
+          <ac:spMkLst>
+            <pc:docMk/>
+            <pc:sldMk cId="2773007854" sldId="572"/>
+            <ac:spMk id="6" creationId="{0BB40221-4A4C-4967-A2D2-883873C2B121}"/>
+          </ac:spMkLst>
+        </pc:spChg>
+      </pc:sldChg>
+      <pc:sldChg chg="modSp mod">
+        <pc:chgData name="Jimenez Martinez, Pablo" userId="713675c2-bab4-4c20-ae51-6cb24299fdbd" providerId="ADAL" clId="{CB2CE608-4B17-4114-A01E-68AB8ADD06B6}" dt="2022-03-23T12:01:20.458" v="709" actId="6549"/>
+        <pc:sldMkLst>
+          <pc:docMk/>
+          <pc:sldMk cId="4068828634" sldId="573"/>
+        </pc:sldMkLst>
+        <pc:spChg chg="mod">
+          <ac:chgData name="Jimenez Martinez, Pablo" userId="713675c2-bab4-4c20-ae51-6cb24299fdbd" providerId="ADAL" clId="{CB2CE608-4B17-4114-A01E-68AB8ADD06B6}" dt="2022-03-23T12:01:20.458" v="709" actId="6549"/>
+          <ac:spMkLst>
+            <pc:docMk/>
+            <pc:sldMk cId="4068828634" sldId="573"/>
+            <ac:spMk id="170" creationId="{00000000-0000-0000-0000-000000000000}"/>
+          </ac:spMkLst>
+        </pc:spChg>
+      </pc:sldChg>
+      <pc:sldChg chg="del">
+        <pc:chgData name="Jimenez Martinez, Pablo" userId="713675c2-bab4-4c20-ae51-6cb24299fdbd" providerId="ADAL" clId="{CB2CE608-4B17-4114-A01E-68AB8ADD06B6}" dt="2022-03-23T11:49:26.789" v="90" actId="47"/>
+        <pc:sldMkLst>
+          <pc:docMk/>
+          <pc:sldMk cId="3070921349" sldId="578"/>
+        </pc:sldMkLst>
+      </pc:sldChg>
+      <pc:sldChg chg="addSp modSp del">
+        <pc:chgData name="Jimenez Martinez, Pablo" userId="713675c2-bab4-4c20-ae51-6cb24299fdbd" providerId="ADAL" clId="{CB2CE608-4B17-4114-A01E-68AB8ADD06B6}" dt="2022-03-24T07:24:15.652" v="789" actId="47"/>
+        <pc:sldMkLst>
+          <pc:docMk/>
+          <pc:sldMk cId="1943026793" sldId="581"/>
+        </pc:sldMkLst>
+        <pc:spChg chg="add mod">
+          <ac:chgData name="Jimenez Martinez, Pablo" userId="713675c2-bab4-4c20-ae51-6cb24299fdbd" providerId="ADAL" clId="{CB2CE608-4B17-4114-A01E-68AB8ADD06B6}" dt="2022-03-23T12:02:47.101" v="768"/>
+          <ac:spMkLst>
+            <pc:docMk/>
+            <pc:sldMk cId="1943026793" sldId="581"/>
+            <ac:spMk id="16" creationId="{0A1EC8A3-A9CF-43C2-B191-FEC0FC5CC2C8}"/>
+          </ac:spMkLst>
+        </pc:spChg>
+      </pc:sldChg>
+      <pc:sldChg chg="addSp modSp del">
+        <pc:chgData name="Jimenez Martinez, Pablo" userId="713675c2-bab4-4c20-ae51-6cb24299fdbd" providerId="ADAL" clId="{CB2CE608-4B17-4114-A01E-68AB8ADD06B6}" dt="2022-03-24T07:24:14.836" v="788" actId="47"/>
+        <pc:sldMkLst>
+          <pc:docMk/>
+          <pc:sldMk cId="2227367454" sldId="583"/>
+        </pc:sldMkLst>
+        <pc:spChg chg="add mod">
+          <ac:chgData name="Jimenez Martinez, Pablo" userId="713675c2-bab4-4c20-ae51-6cb24299fdbd" providerId="ADAL" clId="{CB2CE608-4B17-4114-A01E-68AB8ADD06B6}" dt="2022-03-23T12:02:53.465" v="769"/>
+          <ac:spMkLst>
+            <pc:docMk/>
+            <pc:sldMk cId="2227367454" sldId="583"/>
+            <ac:spMk id="15" creationId="{F0C24E1F-20DD-448D-A403-12D6BF573BB8}"/>
+          </ac:spMkLst>
+        </pc:spChg>
+      </pc:sldChg>
+      <pc:sldChg chg="addSp modSp del">
+        <pc:chgData name="Jimenez Martinez, Pablo" userId="713675c2-bab4-4c20-ae51-6cb24299fdbd" providerId="ADAL" clId="{CB2CE608-4B17-4114-A01E-68AB8ADD06B6}" dt="2022-03-24T07:24:13.438" v="787" actId="47"/>
+        <pc:sldMkLst>
+          <pc:docMk/>
+          <pc:sldMk cId="833658107" sldId="584"/>
+        </pc:sldMkLst>
+        <pc:spChg chg="add mod">
+          <ac:chgData name="Jimenez Martinez, Pablo" userId="713675c2-bab4-4c20-ae51-6cb24299fdbd" providerId="ADAL" clId="{CB2CE608-4B17-4114-A01E-68AB8ADD06B6}" dt="2022-03-23T12:03:08.692" v="770"/>
+          <ac:spMkLst>
+            <pc:docMk/>
+            <pc:sldMk cId="833658107" sldId="584"/>
+            <ac:spMk id="21" creationId="{CB71DEBF-3C4B-427D-9AC4-62AA3625412B}"/>
+          </ac:spMkLst>
+        </pc:spChg>
+      </pc:sldChg>
+      <pc:sldChg chg="addSp modSp del">
+        <pc:chgData name="Jimenez Martinez, Pablo" userId="713675c2-bab4-4c20-ae51-6cb24299fdbd" providerId="ADAL" clId="{CB2CE608-4B17-4114-A01E-68AB8ADD06B6}" dt="2022-03-24T07:24:12.524" v="786" actId="47"/>
+        <pc:sldMkLst>
+          <pc:docMk/>
+          <pc:sldMk cId="3454759851" sldId="585"/>
+        </pc:sldMkLst>
+        <pc:spChg chg="add mod">
+          <ac:chgData name="Jimenez Martinez, Pablo" userId="713675c2-bab4-4c20-ae51-6cb24299fdbd" providerId="ADAL" clId="{CB2CE608-4B17-4114-A01E-68AB8ADD06B6}" dt="2022-03-23T12:03:11.855" v="771"/>
+          <ac:spMkLst>
+            <pc:docMk/>
+            <pc:sldMk cId="3454759851" sldId="585"/>
+            <ac:spMk id="15" creationId="{D2E11DD3-BA8F-409C-B3CF-ABE1F7115330}"/>
+          </ac:spMkLst>
+        </pc:spChg>
+      </pc:sldChg>
+    </pc:docChg>
+  </pc:docChgLst>
 </pc:chgInfo>
 </file>
 
@@ -1011,7 +1012,7 @@
             <a:fld id="{86C988DC-9DE3-4390-97AB-D61B85DACE57}" type="datetimeFigureOut">
               <a:rPr lang="pt-PT" smtClean="0"/>
               <a:pPr/>
-              <a:t>27/05/2022</a:t>
+              <a:t>06/06/2022</a:t>
             </a:fld>
             <a:endParaRPr lang="pt-PT"/>
           </a:p>
@@ -1090,7 +1091,7 @@
             <a:fld id="{2F190BF9-40D8-49B5-87EF-599BB2C7EE93}" type="slidenum">
               <a:rPr lang="pt-PT" smtClean="0"/>
               <a:pPr/>
-              <a:t>‹#›</a:t>
+              <a:t>‹Nº›</a:t>
             </a:fld>
             <a:endParaRPr lang="pt-PT"/>
           </a:p>
@@ -1190,7 +1191,7 @@
             <a:fld id="{0835B8F7-DAC4-4931-8AED-4356A8B2FD64}" type="datetimeFigureOut">
               <a:rPr lang="pt-BR" smtClean="0"/>
               <a:pPr/>
-              <a:t>27/05/2022</a:t>
+              <a:t>06/06/2022</a:t>
             </a:fld>
             <a:endParaRPr lang="pt-BR" dirty="0"/>
           </a:p>
@@ -1350,7 +1351,7 @@
             <a:fld id="{C0696B5C-12A0-4042-B4D0-BD3B9A4F58C6}" type="slidenum">
               <a:rPr lang="pt-BR" smtClean="0"/>
               <a:pPr/>
-              <a:t>‹#›</a:t>
+              <a:t>‹Nº›</a:t>
             </a:fld>
             <a:endParaRPr lang="pt-BR" dirty="0"/>
           </a:p>
@@ -1644,6 +1645,116 @@
     </p:spTree>
     <p:extLst>
       <p:ext uri="{BB962C8B-B14F-4D97-AF65-F5344CB8AC3E}">
+        <p14:creationId xmlns:p14="http://schemas.microsoft.com/office/powerpoint/2010/main" val="2399380896"/>
+      </p:ext>
+    </p:extLst>
+  </p:cSld>
+  <p:clrMapOvr>
+    <a:masterClrMapping/>
+  </p:clrMapOvr>
+</p:notes>
+</file>
+
+<file path=ppt/notesSlides/notesSlide11.xml><?xml version="1.0" encoding="utf-8"?>
+<p:notes xmlns:a="http://schemas.openxmlformats.org/drawingml/2006/main" xmlns:r="http://schemas.openxmlformats.org/officeDocument/2006/relationships" xmlns:p="http://schemas.openxmlformats.org/presentationml/2006/main" showMasterSp="0" showMasterPhAnim="0">
+  <p:cSld>
+    <p:spTree>
+      <p:nvGrpSpPr>
+        <p:cNvPr id="1" name="Shape 191"/>
+        <p:cNvGrpSpPr/>
+        <p:nvPr/>
+      </p:nvGrpSpPr>
+      <p:grpSpPr>
+        <a:xfrm>
+          <a:off x="0" y="0"/>
+          <a:ext cx="0" cy="0"/>
+          <a:chOff x="0" y="0"/>
+          <a:chExt cx="0" cy="0"/>
+        </a:xfrm>
+      </p:grpSpPr>
+      <p:sp>
+        <p:nvSpPr>
+          <p:cNvPr id="192" name="Shape 192"/>
+          <p:cNvSpPr txBox="1">
+            <a:spLocks noGrp="1"/>
+          </p:cNvSpPr>
+          <p:nvPr>
+            <p:ph type="body" idx="1"/>
+          </p:nvPr>
+        </p:nvSpPr>
+        <p:spPr>
+          <a:xfrm>
+            <a:off x="686113" y="4400687"/>
+            <a:ext cx="5485800" cy="3600599"/>
+          </a:xfrm>
+          <a:prstGeom prst="rect">
+            <a:avLst/>
+          </a:prstGeom>
+          <a:noFill/>
+          <a:ln>
+            <a:noFill/>
+          </a:ln>
+        </p:spPr>
+        <p:txBody>
+          <a:bodyPr lIns="90325" tIns="90325" rIns="90325" bIns="90325" anchor="ctr" anchorCtr="0">
+            <a:noAutofit/>
+          </a:bodyPr>
+          <a:lstStyle/>
+          <a:p>
+            <a:pPr lvl="0" rtl="0">
+              <a:spcBef>
+                <a:spcPts val="0"/>
+              </a:spcBef>
+              <a:buNone/>
+            </a:pPr>
+            <a:endParaRPr dirty="0"/>
+          </a:p>
+        </p:txBody>
+      </p:sp>
+      <p:sp>
+        <p:nvSpPr>
+          <p:cNvPr id="193" name="Shape 193"/>
+          <p:cNvSpPr>
+            <a:spLocks noGrp="1" noRot="1" noChangeAspect="1"/>
+          </p:cNvSpPr>
+          <p:nvPr>
+            <p:ph type="sldImg" idx="2"/>
+          </p:nvPr>
+        </p:nvSpPr>
+        <p:spPr>
+          <a:xfrm>
+            <a:off x="685800" y="1143000"/>
+            <a:ext cx="5486400" cy="3086100"/>
+          </a:xfrm>
+          <a:custGeom>
+            <a:avLst/>
+            <a:gdLst/>
+            <a:ahLst/>
+            <a:cxnLst/>
+            <a:rect l="0" t="0" r="0" b="0"/>
+            <a:pathLst>
+              <a:path w="120000" h="120000" extrusionOk="0">
+                <a:moveTo>
+                  <a:pt x="0" y="0"/>
+                </a:moveTo>
+                <a:lnTo>
+                  <a:pt x="120000" y="0"/>
+                </a:lnTo>
+                <a:lnTo>
+                  <a:pt x="120000" y="120000"/>
+                </a:lnTo>
+                <a:lnTo>
+                  <a:pt x="0" y="120000"/>
+                </a:lnTo>
+                <a:close/>
+              </a:path>
+            </a:pathLst>
+          </a:custGeom>
+        </p:spPr>
+      </p:sp>
+    </p:spTree>
+    <p:extLst>
+      <p:ext uri="{BB962C8B-B14F-4D97-AF65-F5344CB8AC3E}">
         <p14:creationId xmlns:p14="http://schemas.microsoft.com/office/powerpoint/2010/main" val="2352904943"/>
       </p:ext>
     </p:extLst>
@@ -1921,6 +2032,124 @@
           <a:lstStyle/>
           <a:p>
             <a:pPr lvl="0" rtl="0">
+              <a:lnSpc>
+                <a:spcPct val="90000"/>
+              </a:lnSpc>
+              <a:spcBef>
+                <a:spcPts val="0"/>
+              </a:spcBef>
+              <a:buNone/>
+            </a:pPr>
+            <a:r>
+              <a:rPr lang="es" sz="1200" dirty="0">
+                <a:solidFill>
+                  <a:srgbClr val="000000"/>
+                </a:solidFill>
+                <a:latin typeface="Calibri"/>
+                <a:ea typeface="Calibri"/>
+                <a:cs typeface="Calibri"/>
+                <a:sym typeface="Calibri"/>
+              </a:rPr>
+              <a:t>El código fuente es el único legado que dejamos, incluso para uno mismo en un futuro.</a:t>
+            </a:r>
+          </a:p>
+          <a:p>
+            <a:pPr lvl="0" rtl="0">
+              <a:lnSpc>
+                <a:spcPct val="90000"/>
+              </a:lnSpc>
+              <a:spcBef>
+                <a:spcPts val="0"/>
+              </a:spcBef>
+              <a:buNone/>
+            </a:pPr>
+            <a:endParaRPr lang="es" sz="1200" dirty="0">
+              <a:solidFill>
+                <a:srgbClr val="000000"/>
+              </a:solidFill>
+              <a:latin typeface="Calibri"/>
+              <a:ea typeface="Calibri"/>
+              <a:cs typeface="Calibri"/>
+              <a:sym typeface="Calibri"/>
+            </a:endParaRPr>
+          </a:p>
+          <a:p>
+            <a:pPr lvl="0" rtl="0">
+              <a:lnSpc>
+                <a:spcPct val="90000"/>
+              </a:lnSpc>
+              <a:spcBef>
+                <a:spcPts val="0"/>
+              </a:spcBef>
+              <a:buNone/>
+            </a:pPr>
+            <a:r>
+              <a:rPr lang="es" sz="1200" dirty="0">
+                <a:solidFill>
+                  <a:srgbClr val="000000"/>
+                </a:solidFill>
+                <a:latin typeface="Calibri"/>
+                <a:ea typeface="Calibri"/>
+                <a:cs typeface="Calibri"/>
+                <a:sym typeface="Calibri"/>
+              </a:rPr>
+              <a:t>Hay que escribir código como si se tratara de un libro. </a:t>
+            </a:r>
+          </a:p>
+          <a:p>
+            <a:pPr lvl="0" rtl="0">
+              <a:lnSpc>
+                <a:spcPct val="90000"/>
+              </a:lnSpc>
+              <a:spcBef>
+                <a:spcPts val="0"/>
+              </a:spcBef>
+              <a:buNone/>
+            </a:pPr>
+            <a:endParaRPr lang="es" sz="1200" dirty="0">
+              <a:solidFill>
+                <a:srgbClr val="000000"/>
+              </a:solidFill>
+              <a:latin typeface="Calibri"/>
+              <a:ea typeface="Calibri"/>
+              <a:cs typeface="Calibri"/>
+              <a:sym typeface="Calibri"/>
+            </a:endParaRPr>
+          </a:p>
+          <a:p>
+            <a:pPr lvl="0" rtl="0">
+              <a:lnSpc>
+                <a:spcPct val="90000"/>
+              </a:lnSpc>
+              <a:spcBef>
+                <a:spcPts val="0"/>
+              </a:spcBef>
+              <a:buNone/>
+            </a:pPr>
+            <a:r>
+              <a:rPr lang="es" sz="1200" dirty="0">
+                <a:solidFill>
+                  <a:srgbClr val="000000"/>
+                </a:solidFill>
+                <a:latin typeface="Calibri"/>
+                <a:ea typeface="Calibri"/>
+                <a:cs typeface="Calibri"/>
+                <a:sym typeface="Calibri"/>
+              </a:rPr>
+              <a:t>Cuanto más fácil sea de leer, más fácil será de reescribir o corregir, menos tiempo costará y por tanto más barato será de mantener.</a:t>
+            </a:r>
+            <a:endParaRPr lang="es" sz="800" dirty="0">
+              <a:solidFill>
+                <a:schemeClr val="dk1"/>
+              </a:solidFill>
+              <a:latin typeface="Calibri"/>
+              <a:ea typeface="Calibri"/>
+              <a:cs typeface="Calibri"/>
+              <a:sym typeface="Calibri"/>
+            </a:endParaRPr>
+          </a:p>
+          <a:p>
+            <a:pPr lvl="0" rtl="0">
               <a:spcBef>
                 <a:spcPts val="0"/>
               </a:spcBef>
@@ -2036,6 +2265,18 @@
               </a:spcBef>
               <a:buNone/>
             </a:pPr>
+            <a:r>
+              <a:rPr lang="es-ES" dirty="0"/>
+              <a:t>Luego empezaremos a ver </a:t>
+            </a:r>
+            <a:r>
+              <a:rPr lang="es-ES" dirty="0" err="1"/>
+              <a:t>smells</a:t>
+            </a:r>
+            <a:r>
+              <a:rPr lang="es-ES" dirty="0"/>
+              <a:t> más complejos, más de diseño. Pero eso lo iremos viendo a medida que vamos practicando los sencillos.</a:t>
+            </a:r>
             <a:endParaRPr dirty="0"/>
           </a:p>
         </p:txBody>
@@ -2099,6 +2340,128 @@
   <p:cSld>
     <p:spTree>
       <p:nvGrpSpPr>
+        <p:cNvPr id="1" name="Shape 191"/>
+        <p:cNvGrpSpPr/>
+        <p:nvPr/>
+      </p:nvGrpSpPr>
+      <p:grpSpPr>
+        <a:xfrm>
+          <a:off x="0" y="0"/>
+          <a:ext cx="0" cy="0"/>
+          <a:chOff x="0" y="0"/>
+          <a:chExt cx="0" cy="0"/>
+        </a:xfrm>
+      </p:grpSpPr>
+      <p:sp>
+        <p:nvSpPr>
+          <p:cNvPr id="192" name="Shape 192"/>
+          <p:cNvSpPr txBox="1">
+            <a:spLocks noGrp="1"/>
+          </p:cNvSpPr>
+          <p:nvPr>
+            <p:ph type="body" idx="1"/>
+          </p:nvPr>
+        </p:nvSpPr>
+        <p:spPr>
+          <a:xfrm>
+            <a:off x="686113" y="4400687"/>
+            <a:ext cx="5485800" cy="3600599"/>
+          </a:xfrm>
+          <a:prstGeom prst="rect">
+            <a:avLst/>
+          </a:prstGeom>
+          <a:noFill/>
+          <a:ln>
+            <a:noFill/>
+          </a:ln>
+        </p:spPr>
+        <p:txBody>
+          <a:bodyPr lIns="90325" tIns="90325" rIns="90325" bIns="90325" anchor="ctr" anchorCtr="0">
+            <a:noAutofit/>
+          </a:bodyPr>
+          <a:lstStyle/>
+          <a:p>
+            <a:pPr lvl="0" rtl="0">
+              <a:spcBef>
+                <a:spcPts val="0"/>
+              </a:spcBef>
+              <a:buNone/>
+            </a:pPr>
+            <a:r>
+              <a:rPr lang="es-ES" dirty="0"/>
+              <a:t>No hay que volverse loco haciendo </a:t>
+            </a:r>
+            <a:r>
+              <a:rPr lang="es-ES" dirty="0" err="1"/>
+              <a:t>refactor</a:t>
+            </a:r>
+            <a:r>
+              <a:rPr lang="es-ES" dirty="0"/>
+              <a:t>. Es un proceso iterativo, cada vez que hagamos algún cambio lo mejoramos un poco, hasta que estemos cómodos.</a:t>
+            </a:r>
+            <a:endParaRPr dirty="0"/>
+          </a:p>
+        </p:txBody>
+      </p:sp>
+      <p:sp>
+        <p:nvSpPr>
+          <p:cNvPr id="193" name="Shape 193"/>
+          <p:cNvSpPr>
+            <a:spLocks noGrp="1" noRot="1" noChangeAspect="1"/>
+          </p:cNvSpPr>
+          <p:nvPr>
+            <p:ph type="sldImg" idx="2"/>
+          </p:nvPr>
+        </p:nvSpPr>
+        <p:spPr>
+          <a:xfrm>
+            <a:off x="685800" y="1143000"/>
+            <a:ext cx="5486400" cy="3086100"/>
+          </a:xfrm>
+          <a:custGeom>
+            <a:avLst/>
+            <a:gdLst/>
+            <a:ahLst/>
+            <a:cxnLst/>
+            <a:rect l="0" t="0" r="0" b="0"/>
+            <a:pathLst>
+              <a:path w="120000" h="120000" extrusionOk="0">
+                <a:moveTo>
+                  <a:pt x="0" y="0"/>
+                </a:moveTo>
+                <a:lnTo>
+                  <a:pt x="120000" y="0"/>
+                </a:lnTo>
+                <a:lnTo>
+                  <a:pt x="120000" y="120000"/>
+                </a:lnTo>
+                <a:lnTo>
+                  <a:pt x="0" y="120000"/>
+                </a:lnTo>
+                <a:close/>
+              </a:path>
+            </a:pathLst>
+          </a:custGeom>
+        </p:spPr>
+      </p:sp>
+    </p:spTree>
+    <p:extLst>
+      <p:ext uri="{BB962C8B-B14F-4D97-AF65-F5344CB8AC3E}">
+        <p14:creationId xmlns:p14="http://schemas.microsoft.com/office/powerpoint/2010/main" val="3518392953"/>
+      </p:ext>
+    </p:extLst>
+  </p:cSld>
+  <p:clrMapOvr>
+    <a:masterClrMapping/>
+  </p:clrMapOvr>
+</p:notes>
+</file>
+
+<file path=ppt/notesSlides/notesSlide7.xml><?xml version="1.0" encoding="utf-8"?>
+<p:notes xmlns:a="http://schemas.openxmlformats.org/drawingml/2006/main" xmlns:r="http://schemas.openxmlformats.org/officeDocument/2006/relationships" xmlns:p="http://schemas.openxmlformats.org/presentationml/2006/main" showMasterSp="0" showMasterPhAnim="0">
+  <p:cSld>
+    <p:spTree>
+      <p:nvGrpSpPr>
         <p:cNvPr id="1" name="Shape 165"/>
         <p:cNvGrpSpPr/>
         <p:nvPr/>
@@ -2204,7 +2567,7 @@
 </p:notes>
 </file>
 
-<file path=ppt/notesSlides/notesSlide7.xml><?xml version="1.0" encoding="utf-8"?>
+<file path=ppt/notesSlides/notesSlide8.xml><?xml version="1.0" encoding="utf-8"?>
 <p:notes xmlns:a="http://schemas.openxmlformats.org/drawingml/2006/main" xmlns:r="http://schemas.openxmlformats.org/officeDocument/2006/relationships" xmlns:p="http://schemas.openxmlformats.org/presentationml/2006/main" showMasterSp="0" showMasterPhAnim="0">
   <p:cSld>
     <p:spTree>
@@ -2314,7 +2677,7 @@
 </p:notes>
 </file>
 
-<file path=ppt/notesSlides/notesSlide8.xml><?xml version="1.0" encoding="utf-8"?>
+<file path=ppt/notesSlides/notesSlide9.xml><?xml version="1.0" encoding="utf-8"?>
 <p:notes xmlns:a="http://schemas.openxmlformats.org/drawingml/2006/main" xmlns:r="http://schemas.openxmlformats.org/officeDocument/2006/relationships" xmlns:p="http://schemas.openxmlformats.org/presentationml/2006/main" showMasterSp="0" showMasterPhAnim="0">
   <p:cSld>
     <p:spTree>
@@ -2415,116 +2778,6 @@
     <p:extLst>
       <p:ext uri="{BB962C8B-B14F-4D97-AF65-F5344CB8AC3E}">
         <p14:creationId xmlns:p14="http://schemas.microsoft.com/office/powerpoint/2010/main" val="4139830902"/>
-      </p:ext>
-    </p:extLst>
-  </p:cSld>
-  <p:clrMapOvr>
-    <a:masterClrMapping/>
-  </p:clrMapOvr>
-</p:notes>
-</file>
-
-<file path=ppt/notesSlides/notesSlide9.xml><?xml version="1.0" encoding="utf-8"?>
-<p:notes xmlns:a="http://schemas.openxmlformats.org/drawingml/2006/main" xmlns:r="http://schemas.openxmlformats.org/officeDocument/2006/relationships" xmlns:p="http://schemas.openxmlformats.org/presentationml/2006/main" showMasterSp="0" showMasterPhAnim="0">
-  <p:cSld>
-    <p:spTree>
-      <p:nvGrpSpPr>
-        <p:cNvPr id="1" name="Shape 191"/>
-        <p:cNvGrpSpPr/>
-        <p:nvPr/>
-      </p:nvGrpSpPr>
-      <p:grpSpPr>
-        <a:xfrm>
-          <a:off x="0" y="0"/>
-          <a:ext cx="0" cy="0"/>
-          <a:chOff x="0" y="0"/>
-          <a:chExt cx="0" cy="0"/>
-        </a:xfrm>
-      </p:grpSpPr>
-      <p:sp>
-        <p:nvSpPr>
-          <p:cNvPr id="192" name="Shape 192"/>
-          <p:cNvSpPr txBox="1">
-            <a:spLocks noGrp="1"/>
-          </p:cNvSpPr>
-          <p:nvPr>
-            <p:ph type="body" idx="1"/>
-          </p:nvPr>
-        </p:nvSpPr>
-        <p:spPr>
-          <a:xfrm>
-            <a:off x="686113" y="4400687"/>
-            <a:ext cx="5485800" cy="3600599"/>
-          </a:xfrm>
-          <a:prstGeom prst="rect">
-            <a:avLst/>
-          </a:prstGeom>
-          <a:noFill/>
-          <a:ln>
-            <a:noFill/>
-          </a:ln>
-        </p:spPr>
-        <p:txBody>
-          <a:bodyPr lIns="90325" tIns="90325" rIns="90325" bIns="90325" anchor="ctr" anchorCtr="0">
-            <a:noAutofit/>
-          </a:bodyPr>
-          <a:lstStyle/>
-          <a:p>
-            <a:pPr lvl="0" rtl="0">
-              <a:spcBef>
-                <a:spcPts val="0"/>
-              </a:spcBef>
-              <a:buNone/>
-            </a:pPr>
-            <a:endParaRPr dirty="0"/>
-          </a:p>
-        </p:txBody>
-      </p:sp>
-      <p:sp>
-        <p:nvSpPr>
-          <p:cNvPr id="193" name="Shape 193"/>
-          <p:cNvSpPr>
-            <a:spLocks noGrp="1" noRot="1" noChangeAspect="1"/>
-          </p:cNvSpPr>
-          <p:nvPr>
-            <p:ph type="sldImg" idx="2"/>
-          </p:nvPr>
-        </p:nvSpPr>
-        <p:spPr>
-          <a:xfrm>
-            <a:off x="685800" y="1143000"/>
-            <a:ext cx="5486400" cy="3086100"/>
-          </a:xfrm>
-          <a:custGeom>
-            <a:avLst/>
-            <a:gdLst/>
-            <a:ahLst/>
-            <a:cxnLst/>
-            <a:rect l="0" t="0" r="0" b="0"/>
-            <a:pathLst>
-              <a:path w="120000" h="120000" extrusionOk="0">
-                <a:moveTo>
-                  <a:pt x="0" y="0"/>
-                </a:moveTo>
-                <a:lnTo>
-                  <a:pt x="120000" y="0"/>
-                </a:lnTo>
-                <a:lnTo>
-                  <a:pt x="120000" y="120000"/>
-                </a:lnTo>
-                <a:lnTo>
-                  <a:pt x="0" y="120000"/>
-                </a:lnTo>
-                <a:close/>
-              </a:path>
-            </a:pathLst>
-          </a:custGeom>
-        </p:spPr>
-      </p:sp>
-    </p:spTree>
-    <p:extLst>
-      <p:ext uri="{BB962C8B-B14F-4D97-AF65-F5344CB8AC3E}">
-        <p14:creationId xmlns:p14="http://schemas.microsoft.com/office/powerpoint/2010/main" val="2399380896"/>
       </p:ext>
     </p:extLst>
   </p:cSld>
@@ -2618,7 +2871,7 @@
                 <a14:useLocalDpi xmlns:a14="http://schemas.microsoft.com/office/drawing/2010/main" val="0"/>
               </a:ext>
               <a:ext uri="{96DAC541-7B7A-43D3-8B79-37D633B846F1}">
-                <asvg:svgBlip xmlns:asvg="http://schemas.microsoft.com/office/drawing/2016/SVG/main" xmlns="" r:embed="rId3"/>
+                <asvg:svgBlip xmlns:asvg="http://schemas.microsoft.com/office/drawing/2016/SVG/main" r:embed="rId3"/>
               </a:ext>
             </a:extLst>
           </a:blip>
@@ -2656,7 +2909,7 @@
                 <a14:useLocalDpi xmlns:a14="http://schemas.microsoft.com/office/drawing/2010/main" val="0"/>
               </a:ext>
               <a:ext uri="{96DAC541-7B7A-43D3-8B79-37D633B846F1}">
-                <asvg:svgBlip xmlns:asvg="http://schemas.microsoft.com/office/drawing/2016/SVG/main" xmlns="" r:embed="rId5"/>
+                <asvg:svgBlip xmlns:asvg="http://schemas.microsoft.com/office/drawing/2016/SVG/main" r:embed="rId5"/>
               </a:ext>
             </a:extLst>
           </a:blip>
@@ -2837,7 +3090,7 @@
                 <a:cs typeface="Arial" panose="020B0604020202020204" pitchFamily="34" charset="0"/>
               </a:rPr>
               <a:pPr algn="r"/>
-              <a:t>‹#›</a:t>
+              <a:t>‹Nº›</a:t>
             </a:fld>
             <a:endParaRPr lang="en-US" sz="800" dirty="0">
               <a:solidFill>
@@ -4842,7 +5095,7 @@
               <a:pPr algn="r">
                 <a:buSzPct val="25000"/>
               </a:pPr>
-              <a:t>‹#›</a:t>
+              <a:t>‹Nº›</a:t>
             </a:fld>
             <a:endParaRPr lang="es" sz="1600">
               <a:solidFill>
@@ -5575,7 +5828,7 @@
               <a:pPr algn="r">
                 <a:buSzPct val="25000"/>
               </a:pPr>
-              <a:t>‹#›</a:t>
+              <a:t>‹Nº›</a:t>
             </a:fld>
             <a:endParaRPr lang="es" sz="1600">
               <a:solidFill>
@@ -8286,23 +8539,12 @@
               </a:lnSpc>
             </a:pPr>
             <a:r>
-              <a:rPr lang="en-US" sz="3600" dirty="0" smtClean="0">
+              <a:rPr lang="en-US" sz="3600" dirty="0">
                 <a:latin typeface="Calibri" panose="020F0502020204030204" pitchFamily="34" charset="0"/>
                 <a:cs typeface="Calibri" panose="020F0502020204030204" pitchFamily="34" charset="0"/>
               </a:rPr>
-              <a:t>Kata: </a:t>
-            </a:r>
-            <a:r>
-              <a:rPr lang="en-US" sz="3600" dirty="0" smtClean="0">
-                <a:latin typeface="Calibri" panose="020F0502020204030204" pitchFamily="34" charset="0"/>
-                <a:cs typeface="Calibri" panose="020F0502020204030204" pitchFamily="34" charset="0"/>
-              </a:rPr>
-              <a:t>Roman-Decimal</a:t>
-            </a:r>
-            <a:endParaRPr lang="en-US" sz="3600" dirty="0">
-              <a:latin typeface="Calibri" panose="020F0502020204030204" pitchFamily="34" charset="0"/>
-              <a:cs typeface="Calibri" panose="020F0502020204030204" pitchFamily="34" charset="0"/>
-            </a:endParaRPr>
+              <a:t>Kata: Roman-Decimal</a:t>
+            </a:r>
           </a:p>
         </p:txBody>
       </p:sp>
@@ -8436,7 +8678,7 @@
               </a:tabLst>
             </a:pPr>
             <a:r>
-              <a:rPr lang="es-ES" dirty="0" smtClean="0">
+              <a:rPr lang="es-ES" dirty="0">
                 <a:latin typeface="Calibri"/>
                 <a:ea typeface="Calibri"/>
                 <a:cs typeface="Calibri"/>
@@ -8444,12 +8686,6 @@
               </a:rPr>
               <a:t>TDD</a:t>
             </a:r>
-            <a:endParaRPr lang="es-ES" dirty="0">
-              <a:latin typeface="Calibri"/>
-              <a:ea typeface="Calibri"/>
-              <a:cs typeface="Calibri"/>
-              <a:sym typeface="Calibri"/>
-            </a:endParaRPr>
           </a:p>
         </p:txBody>
       </p:sp>
@@ -8497,6 +8733,718 @@
       </p:grpSpPr>
       <p:sp>
         <p:nvSpPr>
+          <p:cNvPr id="195" name="Shape 195"/>
+          <p:cNvSpPr txBox="1">
+            <a:spLocks noGrp="1"/>
+          </p:cNvSpPr>
+          <p:nvPr>
+            <p:ph type="title"/>
+          </p:nvPr>
+        </p:nvSpPr>
+        <p:spPr>
+          <a:xfrm>
+            <a:off x="609600" y="274635"/>
+            <a:ext cx="10972800" cy="686800"/>
+          </a:xfrm>
+          <a:prstGeom prst="rect">
+            <a:avLst/>
+          </a:prstGeom>
+          <a:noFill/>
+          <a:ln>
+            <a:noFill/>
+          </a:ln>
+        </p:spPr>
+        <p:txBody>
+          <a:bodyPr vert="horz" lIns="121900" tIns="60933" rIns="121900" bIns="60933" rtlCol="0" anchor="ctr" anchorCtr="0">
+            <a:noAutofit/>
+          </a:bodyPr>
+          <a:lstStyle/>
+          <a:p>
+            <a:pPr lvl="0" algn="l">
+              <a:buSzPct val="25000"/>
+            </a:pPr>
+            <a:r>
+              <a:rPr lang="es" sz="4267" b="1" dirty="0">
+                <a:solidFill>
+                  <a:srgbClr val="00B0F0"/>
+                </a:solidFill>
+                <a:latin typeface="Times New Roman" panose="02020603050405020304" pitchFamily="18" charset="0"/>
+                <a:cs typeface="Times New Roman" panose="02020603050405020304" pitchFamily="18" charset="0"/>
+              </a:rPr>
+              <a:t>Roman-Decimal </a:t>
+            </a:r>
+            <a:r>
+              <a:rPr lang="es" sz="2667" dirty="0">
+                <a:solidFill>
+                  <a:srgbClr val="00B0F0"/>
+                </a:solidFill>
+                <a:latin typeface="Times New Roman" panose="02020603050405020304" pitchFamily="18" charset="0"/>
+                <a:cs typeface="Times New Roman" panose="02020603050405020304" pitchFamily="18" charset="0"/>
+              </a:rPr>
+              <a:t>(Reglas)</a:t>
+            </a:r>
+            <a:endParaRPr lang="es" sz="1600" dirty="0">
+              <a:solidFill>
+                <a:srgbClr val="00B0F0"/>
+              </a:solidFill>
+              <a:latin typeface="Times New Roman" panose="02020603050405020304" pitchFamily="18" charset="0"/>
+              <a:cs typeface="Times New Roman" panose="02020603050405020304" pitchFamily="18" charset="0"/>
+            </a:endParaRPr>
+          </a:p>
+        </p:txBody>
+      </p:sp>
+      <p:sp>
+        <p:nvSpPr>
+          <p:cNvPr id="196" name="Shape 196"/>
+          <p:cNvSpPr txBox="1"/>
+          <p:nvPr/>
+        </p:nvSpPr>
+        <p:spPr>
+          <a:xfrm>
+            <a:off x="6121305" y="1124744"/>
+            <a:ext cx="5760640" cy="5040560"/>
+          </a:xfrm>
+          <a:prstGeom prst="rect">
+            <a:avLst/>
+          </a:prstGeom>
+          <a:noFill/>
+          <a:ln>
+            <a:noFill/>
+          </a:ln>
+        </p:spPr>
+        <p:txBody>
+          <a:bodyPr lIns="121900" tIns="60933" rIns="121900" bIns="60933" anchor="t" anchorCtr="0">
+            <a:noAutofit/>
+          </a:bodyPr>
+          <a:lstStyle/>
+          <a:p>
+            <a:pPr algn="just">
+              <a:spcBef>
+                <a:spcPts val="533"/>
+              </a:spcBef>
+              <a:tabLst>
+                <a:tab pos="480472" algn="l"/>
+              </a:tabLst>
+            </a:pPr>
+            <a:endParaRPr lang="es-ES" sz="1600" dirty="0">
+              <a:latin typeface="Calibri" panose="020F0502020204030204" pitchFamily="34" charset="0"/>
+              <a:ea typeface="Calibri"/>
+              <a:cs typeface="Calibri" panose="020F0502020204030204" pitchFamily="34" charset="0"/>
+              <a:sym typeface="Calibri"/>
+            </a:endParaRPr>
+          </a:p>
+          <a:p>
+            <a:pPr marL="342900" lvl="0" indent="-342900" algn="just">
+              <a:lnSpc>
+                <a:spcPct val="107000"/>
+              </a:lnSpc>
+              <a:spcAft>
+                <a:spcPts val="800"/>
+              </a:spcAft>
+              <a:buSzPts val="1000"/>
+              <a:buFont typeface="Symbol" panose="05050102010706020507" pitchFamily="18" charset="2"/>
+              <a:buChar char=""/>
+              <a:tabLst>
+                <a:tab pos="457200" algn="l"/>
+              </a:tabLst>
+            </a:pPr>
+            <a:r>
+              <a:rPr lang="es-ES" sz="1600" dirty="0">
+                <a:latin typeface="Times New Roman" panose="02020603050405020304" pitchFamily="18" charset="0"/>
+                <a:ea typeface="Calibri" panose="020F0502020204030204" pitchFamily="34" charset="0"/>
+                <a:cs typeface="Times New Roman" panose="02020603050405020304" pitchFamily="18" charset="0"/>
+              </a:rPr>
+              <a:t>Los números romanos siempre se escriben y leen de </a:t>
+            </a:r>
+            <a:r>
+              <a:rPr lang="es-ES" sz="1600" b="1" dirty="0">
+                <a:latin typeface="Times New Roman" panose="02020603050405020304" pitchFamily="18" charset="0"/>
+                <a:ea typeface="Calibri" panose="020F0502020204030204" pitchFamily="34" charset="0"/>
+                <a:cs typeface="Times New Roman" panose="02020603050405020304" pitchFamily="18" charset="0"/>
+              </a:rPr>
+              <a:t>izquierda a derecha</a:t>
+            </a:r>
+            <a:r>
+              <a:rPr lang="es-ES" sz="1600" dirty="0">
+                <a:latin typeface="Times New Roman" panose="02020603050405020304" pitchFamily="18" charset="0"/>
+                <a:ea typeface="Calibri" panose="020F0502020204030204" pitchFamily="34" charset="0"/>
+                <a:cs typeface="Times New Roman" panose="02020603050405020304" pitchFamily="18" charset="0"/>
+              </a:rPr>
+              <a:t>, es decir, empezando por los números de mayor valor, y de </a:t>
+            </a:r>
+            <a:r>
+              <a:rPr lang="es-ES" sz="1600" b="1" dirty="0">
+                <a:latin typeface="Times New Roman" panose="02020603050405020304" pitchFamily="18" charset="0"/>
+                <a:ea typeface="Calibri" panose="020F0502020204030204" pitchFamily="34" charset="0"/>
+                <a:cs typeface="Times New Roman" panose="02020603050405020304" pitchFamily="18" charset="0"/>
+              </a:rPr>
+              <a:t>dígito en dígito</a:t>
+            </a:r>
+            <a:r>
+              <a:rPr lang="es-ES" sz="1600" dirty="0">
+                <a:latin typeface="Times New Roman" panose="02020603050405020304" pitchFamily="18" charset="0"/>
+                <a:ea typeface="Calibri" panose="020F0502020204030204" pitchFamily="34" charset="0"/>
+                <a:cs typeface="Times New Roman" panose="02020603050405020304" pitchFamily="18" charset="0"/>
+              </a:rPr>
+              <a:t>.</a:t>
+            </a:r>
+          </a:p>
+          <a:p>
+            <a:pPr marL="342900" lvl="0" indent="-342900" algn="just">
+              <a:lnSpc>
+                <a:spcPct val="107000"/>
+              </a:lnSpc>
+              <a:spcAft>
+                <a:spcPts val="800"/>
+              </a:spcAft>
+              <a:buSzPts val="1000"/>
+              <a:buFont typeface="Symbol" panose="05050102010706020507" pitchFamily="18" charset="2"/>
+              <a:buChar char=""/>
+              <a:tabLst>
+                <a:tab pos="457200" algn="l"/>
+              </a:tabLst>
+            </a:pPr>
+            <a:r>
+              <a:rPr lang="es-ES" sz="1600" dirty="0">
+                <a:latin typeface="Times New Roman" panose="02020603050405020304" pitchFamily="18" charset="0"/>
+                <a:ea typeface="Calibri" panose="020F0502020204030204" pitchFamily="34" charset="0"/>
+                <a:cs typeface="Times New Roman" panose="02020603050405020304" pitchFamily="18" charset="0"/>
+              </a:rPr>
+              <a:t>Los números </a:t>
+            </a:r>
+            <a:r>
+              <a:rPr lang="es-ES" sz="1600" b="1" dirty="0">
+                <a:latin typeface="Times New Roman" panose="02020603050405020304" pitchFamily="18" charset="0"/>
+                <a:ea typeface="Calibri" panose="020F0502020204030204" pitchFamily="34" charset="0"/>
+                <a:cs typeface="Times New Roman" panose="02020603050405020304" pitchFamily="18" charset="0"/>
+              </a:rPr>
+              <a:t>seguidos</a:t>
+            </a:r>
+            <a:r>
+              <a:rPr lang="es-ES" sz="1600" dirty="0">
+                <a:latin typeface="Times New Roman" panose="02020603050405020304" pitchFamily="18" charset="0"/>
+                <a:ea typeface="Calibri" panose="020F0502020204030204" pitchFamily="34" charset="0"/>
+                <a:cs typeface="Times New Roman" panose="02020603050405020304" pitchFamily="18" charset="0"/>
+              </a:rPr>
+              <a:t> de otro de valor </a:t>
+            </a:r>
+            <a:r>
+              <a:rPr lang="es-ES" sz="1600" b="1" dirty="0">
+                <a:latin typeface="Times New Roman" panose="02020603050405020304" pitchFamily="18" charset="0"/>
+                <a:ea typeface="Calibri" panose="020F0502020204030204" pitchFamily="34" charset="0"/>
+                <a:cs typeface="Times New Roman" panose="02020603050405020304" pitchFamily="18" charset="0"/>
+              </a:rPr>
+              <a:t>igual o menor se suman </a:t>
+            </a:r>
+            <a:r>
+              <a:rPr lang="es-ES" sz="1600" dirty="0">
+                <a:latin typeface="Times New Roman" panose="02020603050405020304" pitchFamily="18" charset="0"/>
+                <a:ea typeface="Calibri" panose="020F0502020204030204" pitchFamily="34" charset="0"/>
+                <a:cs typeface="Times New Roman" panose="02020603050405020304" pitchFamily="18" charset="0"/>
+              </a:rPr>
+              <a:t>siempre, como, por ejemplo, XXII que sería 10 + 10 + 1 + 1= 22.</a:t>
+            </a:r>
+          </a:p>
+          <a:p>
+            <a:pPr marL="342900" lvl="0" indent="-342900" algn="just">
+              <a:lnSpc>
+                <a:spcPct val="107000"/>
+              </a:lnSpc>
+              <a:spcAft>
+                <a:spcPts val="800"/>
+              </a:spcAft>
+              <a:buSzPts val="1000"/>
+              <a:buFont typeface="Symbol" panose="05050102010706020507" pitchFamily="18" charset="2"/>
+              <a:buChar char=""/>
+              <a:tabLst>
+                <a:tab pos="457200" algn="l"/>
+              </a:tabLst>
+            </a:pPr>
+            <a:r>
+              <a:rPr lang="es-ES" sz="1600" dirty="0">
+                <a:latin typeface="Times New Roman" panose="02020603050405020304" pitchFamily="18" charset="0"/>
+                <a:ea typeface="Calibri" panose="020F0502020204030204" pitchFamily="34" charset="0"/>
+                <a:cs typeface="Times New Roman" panose="02020603050405020304" pitchFamily="18" charset="0"/>
+              </a:rPr>
+              <a:t>Los números </a:t>
+            </a:r>
+            <a:r>
+              <a:rPr lang="es-ES" sz="1600" b="1" dirty="0">
+                <a:latin typeface="Times New Roman" panose="02020603050405020304" pitchFamily="18" charset="0"/>
+                <a:ea typeface="Calibri" panose="020F0502020204030204" pitchFamily="34" charset="0"/>
+                <a:cs typeface="Times New Roman" panose="02020603050405020304" pitchFamily="18" charset="0"/>
+              </a:rPr>
+              <a:t>seguidos</a:t>
+            </a:r>
+            <a:r>
+              <a:rPr lang="es-ES" sz="1600" dirty="0">
+                <a:latin typeface="Times New Roman" panose="02020603050405020304" pitchFamily="18" charset="0"/>
+                <a:ea typeface="Calibri" panose="020F0502020204030204" pitchFamily="34" charset="0"/>
+                <a:cs typeface="Times New Roman" panose="02020603050405020304" pitchFamily="18" charset="0"/>
+              </a:rPr>
+              <a:t> de otro de valor </a:t>
+            </a:r>
+            <a:r>
+              <a:rPr lang="es-ES" sz="1600" b="1" dirty="0">
+                <a:latin typeface="Times New Roman" panose="02020603050405020304" pitchFamily="18" charset="0"/>
+                <a:ea typeface="Calibri" panose="020F0502020204030204" pitchFamily="34" charset="0"/>
+                <a:cs typeface="Times New Roman" panose="02020603050405020304" pitchFamily="18" charset="0"/>
+              </a:rPr>
+              <a:t>mayor se restan </a:t>
+            </a:r>
+            <a:r>
+              <a:rPr lang="es-ES" sz="1600" dirty="0">
+                <a:latin typeface="Times New Roman" panose="02020603050405020304" pitchFamily="18" charset="0"/>
+                <a:ea typeface="Calibri" panose="020F0502020204030204" pitchFamily="34" charset="0"/>
+                <a:cs typeface="Times New Roman" panose="02020603050405020304" pitchFamily="18" charset="0"/>
+              </a:rPr>
+              <a:t>siempre, como, por ejemplo, XIX que sería 10 + (1 – 10) = 19.</a:t>
+            </a:r>
+          </a:p>
+          <a:p>
+            <a:pPr marL="342900" lvl="0" indent="-342900" algn="just">
+              <a:lnSpc>
+                <a:spcPct val="107000"/>
+              </a:lnSpc>
+              <a:spcAft>
+                <a:spcPts val="800"/>
+              </a:spcAft>
+              <a:buSzPts val="1000"/>
+              <a:buFont typeface="Symbol" panose="05050102010706020507" pitchFamily="18" charset="2"/>
+              <a:buChar char=""/>
+              <a:tabLst>
+                <a:tab pos="457200" algn="l"/>
+              </a:tabLst>
+            </a:pPr>
+            <a:r>
+              <a:rPr lang="es-ES" sz="1600" dirty="0">
+                <a:latin typeface="Times New Roman" panose="02020603050405020304" pitchFamily="18" charset="0"/>
+                <a:ea typeface="Calibri" panose="020F0502020204030204" pitchFamily="34" charset="0"/>
+                <a:cs typeface="Times New Roman" panose="02020603050405020304" pitchFamily="18" charset="0"/>
+              </a:rPr>
+              <a:t>El número I y sus múltiplos X y C, pueden colocarse delante de un número mayor para restar valor, pero sin repetirse. Además, solo pueden restar valor a números inmediatamente superior, pero no a valores mucho más elevados. Es decir, I solo puede restar a V y X, X a L y C, y C a D y M.</a:t>
+            </a:r>
+          </a:p>
+          <a:p>
+            <a:pPr marL="342900" lvl="0" indent="-342900" algn="just">
+              <a:lnSpc>
+                <a:spcPct val="107000"/>
+              </a:lnSpc>
+              <a:spcAft>
+                <a:spcPts val="800"/>
+              </a:spcAft>
+              <a:buSzPts val="1000"/>
+              <a:buFont typeface="Symbol" panose="05050102010706020507" pitchFamily="18" charset="2"/>
+              <a:buChar char=""/>
+              <a:tabLst>
+                <a:tab pos="457200" algn="l"/>
+              </a:tabLst>
+            </a:pPr>
+            <a:r>
+              <a:rPr lang="es-ES" sz="1600" dirty="0">
+                <a:latin typeface="Times New Roman" panose="02020603050405020304" pitchFamily="18" charset="0"/>
+                <a:ea typeface="Calibri" panose="020F0502020204030204" pitchFamily="34" charset="0"/>
+                <a:cs typeface="Times New Roman" panose="02020603050405020304" pitchFamily="18" charset="0"/>
+              </a:rPr>
+              <a:t>El número V y sus múltiplos de 10, como L y D no se pueden usar para restar en ningún caso. Por ejemplo, el número cuarenta y cinco se escribe XLV y no VL.</a:t>
+            </a:r>
+          </a:p>
+          <a:p>
+            <a:pPr lvl="0" algn="just">
+              <a:lnSpc>
+                <a:spcPct val="107000"/>
+              </a:lnSpc>
+              <a:spcAft>
+                <a:spcPts val="800"/>
+              </a:spcAft>
+              <a:buSzPts val="1000"/>
+              <a:tabLst>
+                <a:tab pos="457200" algn="l"/>
+              </a:tabLst>
+            </a:pPr>
+            <a:endParaRPr lang="es-ES" sz="1600" dirty="0">
+              <a:latin typeface="Calibri" panose="020F0502020204030204" pitchFamily="34" charset="0"/>
+              <a:ea typeface="Calibri" panose="020F0502020204030204" pitchFamily="34" charset="0"/>
+              <a:cs typeface="Times New Roman" panose="02020603050405020304" pitchFamily="18" charset="0"/>
+            </a:endParaRPr>
+          </a:p>
+          <a:p>
+            <a:pPr marL="342900" lvl="0" indent="-342900" algn="just">
+              <a:lnSpc>
+                <a:spcPct val="107000"/>
+              </a:lnSpc>
+              <a:spcAft>
+                <a:spcPts val="800"/>
+              </a:spcAft>
+              <a:buSzPts val="1000"/>
+              <a:buFont typeface="Symbol" panose="05050102010706020507" pitchFamily="18" charset="2"/>
+              <a:buChar char=""/>
+              <a:tabLst>
+                <a:tab pos="457200" algn="l"/>
+              </a:tabLst>
+            </a:pPr>
+            <a:endParaRPr lang="es-ES" sz="1200" dirty="0">
+              <a:latin typeface="Calibri" panose="020F0502020204030204" pitchFamily="34" charset="0"/>
+              <a:ea typeface="Calibri" panose="020F0502020204030204" pitchFamily="34" charset="0"/>
+              <a:cs typeface="Calibri" panose="020F0502020204030204" pitchFamily="34" charset="0"/>
+            </a:endParaRPr>
+          </a:p>
+          <a:p>
+            <a:pPr lvl="0" algn="just">
+              <a:lnSpc>
+                <a:spcPct val="107000"/>
+              </a:lnSpc>
+              <a:spcAft>
+                <a:spcPts val="800"/>
+              </a:spcAft>
+              <a:buSzPts val="1000"/>
+              <a:tabLst>
+                <a:tab pos="457200" algn="l"/>
+              </a:tabLst>
+            </a:pPr>
+            <a:endParaRPr lang="es-ES" sz="1600" dirty="0">
+              <a:latin typeface="Calibri" panose="020F0502020204030204" pitchFamily="34" charset="0"/>
+              <a:ea typeface="Calibri" panose="020F0502020204030204" pitchFamily="34" charset="0"/>
+              <a:cs typeface="Calibri" panose="020F0502020204030204" pitchFamily="34" charset="0"/>
+            </a:endParaRPr>
+          </a:p>
+          <a:p>
+            <a:pPr algn="just">
+              <a:spcBef>
+                <a:spcPts val="533"/>
+              </a:spcBef>
+              <a:tabLst>
+                <a:tab pos="480472" algn="l"/>
+              </a:tabLst>
+            </a:pPr>
+            <a:endParaRPr lang="es-ES" sz="1200" dirty="0">
+              <a:latin typeface="Calibri"/>
+              <a:ea typeface="Calibri"/>
+              <a:cs typeface="Calibri"/>
+              <a:sym typeface="Calibri"/>
+            </a:endParaRPr>
+          </a:p>
+        </p:txBody>
+      </p:sp>
+      <p:sp>
+        <p:nvSpPr>
+          <p:cNvPr id="3" name="TextBox 2"/>
+          <p:cNvSpPr txBox="1"/>
+          <p:nvPr/>
+        </p:nvSpPr>
+        <p:spPr>
+          <a:xfrm>
+            <a:off x="4295800" y="1336700"/>
+            <a:ext cx="2088232" cy="4616648"/>
+          </a:xfrm>
+          <a:prstGeom prst="rect">
+            <a:avLst/>
+          </a:prstGeom>
+          <a:noFill/>
+        </p:spPr>
+        <p:txBody>
+          <a:bodyPr wrap="square" rtlCol="0">
+            <a:spAutoFit/>
+          </a:bodyPr>
+          <a:lstStyle/>
+          <a:p>
+            <a:pPr>
+              <a:lnSpc>
+                <a:spcPct val="150000"/>
+              </a:lnSpc>
+            </a:pPr>
+            <a:r>
+              <a:rPr lang="es-ES" sz="2800" b="1" dirty="0">
+                <a:solidFill>
+                  <a:schemeClr val="accent4">
+                    <a:lumMod val="75000"/>
+                  </a:schemeClr>
+                </a:solidFill>
+                <a:latin typeface="Times New Roman" panose="02020603050405020304" pitchFamily="18" charset="0"/>
+                <a:cs typeface="Times New Roman" panose="02020603050405020304" pitchFamily="18" charset="0"/>
+              </a:rPr>
+              <a:t>I</a:t>
+            </a:r>
+            <a:r>
+              <a:rPr lang="es-ES" sz="2800" b="1" dirty="0">
+                <a:latin typeface="Times New Roman" panose="02020603050405020304" pitchFamily="18" charset="0"/>
+                <a:cs typeface="Times New Roman" panose="02020603050405020304" pitchFamily="18" charset="0"/>
+              </a:rPr>
+              <a:t> </a:t>
+            </a:r>
+            <a:r>
+              <a:rPr lang="es-ES" sz="2800" dirty="0">
+                <a:latin typeface="Times New Roman" panose="02020603050405020304" pitchFamily="18" charset="0"/>
+                <a:cs typeface="Times New Roman" panose="02020603050405020304" pitchFamily="18" charset="0"/>
+              </a:rPr>
+              <a:t>=</a:t>
+            </a:r>
+            <a:r>
+              <a:rPr lang="es-ES" sz="2800" b="1" dirty="0">
+                <a:latin typeface="Times New Roman" panose="02020603050405020304" pitchFamily="18" charset="0"/>
+                <a:cs typeface="Times New Roman" panose="02020603050405020304" pitchFamily="18" charset="0"/>
+              </a:rPr>
+              <a:t> </a:t>
+            </a:r>
+            <a:r>
+              <a:rPr lang="es-ES" sz="2800" dirty="0">
+                <a:latin typeface="Times New Roman" panose="02020603050405020304" pitchFamily="18" charset="0"/>
+                <a:cs typeface="Times New Roman" panose="02020603050405020304" pitchFamily="18" charset="0"/>
+              </a:rPr>
+              <a:t>1</a:t>
+            </a:r>
+          </a:p>
+          <a:p>
+            <a:pPr>
+              <a:lnSpc>
+                <a:spcPct val="150000"/>
+              </a:lnSpc>
+            </a:pPr>
+            <a:r>
+              <a:rPr lang="es-ES" sz="2800" b="1" dirty="0">
+                <a:solidFill>
+                  <a:schemeClr val="accent4">
+                    <a:lumMod val="75000"/>
+                  </a:schemeClr>
+                </a:solidFill>
+                <a:latin typeface="Times New Roman" panose="02020603050405020304" pitchFamily="18" charset="0"/>
+                <a:cs typeface="Times New Roman" panose="02020603050405020304" pitchFamily="18" charset="0"/>
+              </a:rPr>
+              <a:t>V</a:t>
+            </a:r>
+            <a:r>
+              <a:rPr lang="es-ES" sz="2800" b="1" dirty="0">
+                <a:latin typeface="Times New Roman" panose="02020603050405020304" pitchFamily="18" charset="0"/>
+                <a:cs typeface="Times New Roman" panose="02020603050405020304" pitchFamily="18" charset="0"/>
+              </a:rPr>
+              <a:t> </a:t>
+            </a:r>
+            <a:r>
+              <a:rPr lang="es-ES" sz="2800" dirty="0">
+                <a:latin typeface="Times New Roman" panose="02020603050405020304" pitchFamily="18" charset="0"/>
+                <a:cs typeface="Times New Roman" panose="02020603050405020304" pitchFamily="18" charset="0"/>
+              </a:rPr>
+              <a:t>= 5</a:t>
+            </a:r>
+          </a:p>
+          <a:p>
+            <a:pPr>
+              <a:lnSpc>
+                <a:spcPct val="150000"/>
+              </a:lnSpc>
+            </a:pPr>
+            <a:r>
+              <a:rPr lang="es-ES" sz="2800" b="1" dirty="0">
+                <a:solidFill>
+                  <a:schemeClr val="accent4">
+                    <a:lumMod val="75000"/>
+                  </a:schemeClr>
+                </a:solidFill>
+                <a:latin typeface="Times New Roman" panose="02020603050405020304" pitchFamily="18" charset="0"/>
+                <a:cs typeface="Times New Roman" panose="02020603050405020304" pitchFamily="18" charset="0"/>
+              </a:rPr>
+              <a:t>X</a:t>
+            </a:r>
+            <a:r>
+              <a:rPr lang="es-ES" sz="2800" b="1" dirty="0">
+                <a:latin typeface="Times New Roman" panose="02020603050405020304" pitchFamily="18" charset="0"/>
+                <a:cs typeface="Times New Roman" panose="02020603050405020304" pitchFamily="18" charset="0"/>
+              </a:rPr>
+              <a:t> </a:t>
+            </a:r>
+            <a:r>
+              <a:rPr lang="es-ES" sz="2800" dirty="0">
+                <a:latin typeface="Times New Roman" panose="02020603050405020304" pitchFamily="18" charset="0"/>
+                <a:cs typeface="Times New Roman" panose="02020603050405020304" pitchFamily="18" charset="0"/>
+              </a:rPr>
+              <a:t>= 10</a:t>
+            </a:r>
+          </a:p>
+          <a:p>
+            <a:pPr>
+              <a:lnSpc>
+                <a:spcPct val="150000"/>
+              </a:lnSpc>
+            </a:pPr>
+            <a:r>
+              <a:rPr lang="es-ES" sz="2800" b="1" dirty="0">
+                <a:solidFill>
+                  <a:schemeClr val="accent4">
+                    <a:lumMod val="75000"/>
+                  </a:schemeClr>
+                </a:solidFill>
+                <a:latin typeface="Times New Roman" panose="02020603050405020304" pitchFamily="18" charset="0"/>
+                <a:cs typeface="Times New Roman" panose="02020603050405020304" pitchFamily="18" charset="0"/>
+              </a:rPr>
+              <a:t>L</a:t>
+            </a:r>
+            <a:r>
+              <a:rPr lang="es-ES" sz="2800" b="1" dirty="0">
+                <a:latin typeface="Times New Roman" panose="02020603050405020304" pitchFamily="18" charset="0"/>
+                <a:cs typeface="Times New Roman" panose="02020603050405020304" pitchFamily="18" charset="0"/>
+              </a:rPr>
+              <a:t> </a:t>
+            </a:r>
+            <a:r>
+              <a:rPr lang="es-ES" sz="2800" dirty="0">
+                <a:latin typeface="Times New Roman" panose="02020603050405020304" pitchFamily="18" charset="0"/>
+                <a:cs typeface="Times New Roman" panose="02020603050405020304" pitchFamily="18" charset="0"/>
+              </a:rPr>
+              <a:t>= 50</a:t>
+            </a:r>
+          </a:p>
+          <a:p>
+            <a:pPr>
+              <a:lnSpc>
+                <a:spcPct val="150000"/>
+              </a:lnSpc>
+            </a:pPr>
+            <a:r>
+              <a:rPr lang="es-ES" sz="2800" b="1" dirty="0">
+                <a:solidFill>
+                  <a:schemeClr val="accent4">
+                    <a:lumMod val="75000"/>
+                  </a:schemeClr>
+                </a:solidFill>
+                <a:latin typeface="Times New Roman" panose="02020603050405020304" pitchFamily="18" charset="0"/>
+                <a:cs typeface="Times New Roman" panose="02020603050405020304" pitchFamily="18" charset="0"/>
+              </a:rPr>
+              <a:t>C</a:t>
+            </a:r>
+            <a:r>
+              <a:rPr lang="es-ES" sz="2800" b="1" dirty="0">
+                <a:latin typeface="Times New Roman" panose="02020603050405020304" pitchFamily="18" charset="0"/>
+                <a:cs typeface="Times New Roman" panose="02020603050405020304" pitchFamily="18" charset="0"/>
+              </a:rPr>
+              <a:t> </a:t>
+            </a:r>
+            <a:r>
+              <a:rPr lang="es-ES" sz="2800" dirty="0">
+                <a:latin typeface="Times New Roman" panose="02020603050405020304" pitchFamily="18" charset="0"/>
+                <a:cs typeface="Times New Roman" panose="02020603050405020304" pitchFamily="18" charset="0"/>
+              </a:rPr>
+              <a:t>= 100</a:t>
+            </a:r>
+          </a:p>
+          <a:p>
+            <a:pPr>
+              <a:lnSpc>
+                <a:spcPct val="150000"/>
+              </a:lnSpc>
+            </a:pPr>
+            <a:r>
+              <a:rPr lang="es-ES" sz="2800" b="1" dirty="0">
+                <a:solidFill>
+                  <a:schemeClr val="accent4">
+                    <a:lumMod val="75000"/>
+                  </a:schemeClr>
+                </a:solidFill>
+                <a:latin typeface="Times New Roman" panose="02020603050405020304" pitchFamily="18" charset="0"/>
+                <a:cs typeface="Times New Roman" panose="02020603050405020304" pitchFamily="18" charset="0"/>
+              </a:rPr>
+              <a:t>D</a:t>
+            </a:r>
+            <a:r>
+              <a:rPr lang="es-ES" sz="2800" b="1" dirty="0">
+                <a:latin typeface="Times New Roman" panose="02020603050405020304" pitchFamily="18" charset="0"/>
+                <a:cs typeface="Times New Roman" panose="02020603050405020304" pitchFamily="18" charset="0"/>
+              </a:rPr>
+              <a:t> </a:t>
+            </a:r>
+            <a:r>
+              <a:rPr lang="es-ES" sz="2800" dirty="0">
+                <a:latin typeface="Times New Roman" panose="02020603050405020304" pitchFamily="18" charset="0"/>
+                <a:cs typeface="Times New Roman" panose="02020603050405020304" pitchFamily="18" charset="0"/>
+              </a:rPr>
+              <a:t>= 500</a:t>
+            </a:r>
+          </a:p>
+          <a:p>
+            <a:pPr>
+              <a:lnSpc>
+                <a:spcPct val="150000"/>
+              </a:lnSpc>
+            </a:pPr>
+            <a:r>
+              <a:rPr lang="es-ES" sz="2800" b="1" dirty="0">
+                <a:solidFill>
+                  <a:schemeClr val="accent4">
+                    <a:lumMod val="75000"/>
+                  </a:schemeClr>
+                </a:solidFill>
+                <a:latin typeface="Times New Roman" panose="02020603050405020304" pitchFamily="18" charset="0"/>
+                <a:cs typeface="Times New Roman" panose="02020603050405020304" pitchFamily="18" charset="0"/>
+              </a:rPr>
+              <a:t>M</a:t>
+            </a:r>
+            <a:r>
+              <a:rPr lang="es-ES" sz="2800" b="1" dirty="0">
+                <a:latin typeface="Times New Roman" panose="02020603050405020304" pitchFamily="18" charset="0"/>
+                <a:cs typeface="Times New Roman" panose="02020603050405020304" pitchFamily="18" charset="0"/>
+              </a:rPr>
+              <a:t> </a:t>
+            </a:r>
+            <a:r>
+              <a:rPr lang="es-ES" sz="2800" dirty="0">
+                <a:latin typeface="Times New Roman" panose="02020603050405020304" pitchFamily="18" charset="0"/>
+                <a:cs typeface="Times New Roman" panose="02020603050405020304" pitchFamily="18" charset="0"/>
+              </a:rPr>
+              <a:t>= 1000</a:t>
+            </a:r>
+          </a:p>
+        </p:txBody>
+      </p:sp>
+      <p:pic>
+        <p:nvPicPr>
+          <p:cNvPr id="6" name="Picture 5"/>
+          <p:cNvPicPr>
+            <a:picLocks noChangeAspect="1"/>
+          </p:cNvPicPr>
+          <p:nvPr/>
+        </p:nvPicPr>
+        <p:blipFill>
+          <a:blip r:embed="rId3"/>
+          <a:stretch>
+            <a:fillRect/>
+          </a:stretch>
+        </p:blipFill>
+        <p:spPr>
+          <a:xfrm>
+            <a:off x="609600" y="1916832"/>
+            <a:ext cx="3456384" cy="3456384"/>
+          </a:xfrm>
+          <a:prstGeom prst="rect">
+            <a:avLst/>
+          </a:prstGeom>
+        </p:spPr>
+      </p:pic>
+    </p:spTree>
+  </p:cSld>
+  <p:clrMapOvr>
+    <a:masterClrMapping/>
+  </p:clrMapOvr>
+</p:sld>
+</file>
+
+<file path=ppt/slides/slide11.xml><?xml version="1.0" encoding="utf-8"?>
+<p:sld xmlns:a="http://schemas.openxmlformats.org/drawingml/2006/main" xmlns:r="http://schemas.openxmlformats.org/officeDocument/2006/relationships" xmlns:p="http://schemas.openxmlformats.org/presentationml/2006/main">
+  <p:cSld>
+    <p:spTree>
+      <p:nvGrpSpPr>
+        <p:cNvPr id="1" name="Shape 194"/>
+        <p:cNvGrpSpPr/>
+        <p:nvPr/>
+      </p:nvGrpSpPr>
+      <p:grpSpPr>
+        <a:xfrm>
+          <a:off x="0" y="0"/>
+          <a:ext cx="0" cy="0"/>
+          <a:chOff x="0" y="0"/>
+          <a:chExt cx="0" cy="0"/>
+        </a:xfrm>
+      </p:grpSpPr>
+      <p:sp>
+        <p:nvSpPr>
           <p:cNvPr id="196" name="Shape 196"/>
           <p:cNvSpPr txBox="1"/>
           <p:nvPr/>
@@ -8531,7 +9479,7 @@
               </a:tabLst>
             </a:pPr>
             <a:r>
-              <a:rPr lang="es-ES_tradnl" sz="2400" dirty="0" smtClean="0">
+              <a:rPr lang="es-ES_tradnl" sz="2400" dirty="0">
                 <a:latin typeface="Times New Roman" panose="02020603050405020304" pitchFamily="18" charset="0"/>
                 <a:ea typeface="Calibri"/>
                 <a:cs typeface="Times New Roman" panose="02020603050405020304" pitchFamily="18" charset="0"/>
@@ -8552,7 +9500,7 @@
               </a:tabLst>
             </a:pPr>
             <a:r>
-              <a:rPr lang="es-ES_tradnl" sz="2000" dirty="0" smtClean="0">
+              <a:rPr lang="es-ES_tradnl" sz="2000" dirty="0">
                 <a:latin typeface="Times New Roman" panose="02020603050405020304" pitchFamily="18" charset="0"/>
                 <a:ea typeface="Calibri"/>
                 <a:cs typeface="Times New Roman" panose="02020603050405020304" pitchFamily="18" charset="0"/>
@@ -8576,7 +9524,7 @@
               </a:tabLst>
             </a:pPr>
             <a:r>
-              <a:rPr lang="es-ES_tradnl" sz="2400" dirty="0" smtClean="0">
+              <a:rPr lang="es-ES_tradnl" sz="2400" dirty="0">
                 <a:latin typeface="Times New Roman" panose="02020603050405020304" pitchFamily="18" charset="0"/>
                 <a:ea typeface="Calibri"/>
                 <a:cs typeface="Times New Roman" panose="02020603050405020304" pitchFamily="18" charset="0"/>
@@ -8597,7 +9545,7 @@
               </a:tabLst>
             </a:pPr>
             <a:r>
-              <a:rPr lang="es-ES_tradnl" sz="2000" dirty="0" smtClean="0">
+              <a:rPr lang="es-ES_tradnl" sz="2000" dirty="0">
                 <a:latin typeface="Times New Roman" panose="02020603050405020304" pitchFamily="18" charset="0"/>
                 <a:ea typeface="Calibri"/>
                 <a:cs typeface="Times New Roman" panose="02020603050405020304" pitchFamily="18" charset="0"/>
@@ -8606,7 +9554,7 @@
               <a:t>Aunque se conozca el problema completo, hay que evitar el “</a:t>
             </a:r>
             <a:r>
-              <a:rPr lang="es-ES_tradnl" sz="2000" i="1" dirty="0" smtClean="0">
+              <a:rPr lang="es-ES_tradnl" sz="2000" i="1" dirty="0">
                 <a:latin typeface="Times New Roman" panose="02020603050405020304" pitchFamily="18" charset="0"/>
                 <a:ea typeface="Calibri"/>
                 <a:cs typeface="Times New Roman" panose="02020603050405020304" pitchFamily="18" charset="0"/>
@@ -8615,7 +9563,7 @@
               <a:t>Speculative generalization</a:t>
             </a:r>
             <a:r>
-              <a:rPr lang="es-ES_tradnl" sz="2000" dirty="0" smtClean="0">
+              <a:rPr lang="es-ES_tradnl" sz="2000" dirty="0">
                 <a:latin typeface="Times New Roman" panose="02020603050405020304" pitchFamily="18" charset="0"/>
                 <a:ea typeface="Calibri"/>
                 <a:cs typeface="Times New Roman" panose="02020603050405020304" pitchFamily="18" charset="0"/>
@@ -8639,7 +9587,7 @@
               </a:tabLst>
             </a:pPr>
             <a:r>
-              <a:rPr lang="es-ES_tradnl" sz="2400" dirty="0" smtClean="0">
+              <a:rPr lang="es-ES_tradnl" sz="2400" dirty="0">
                 <a:latin typeface="Times New Roman" panose="02020603050405020304" pitchFamily="18" charset="0"/>
                 <a:ea typeface="Calibri"/>
                 <a:cs typeface="Times New Roman" panose="02020603050405020304" pitchFamily="18" charset="0"/>
@@ -8660,7 +9608,7 @@
               </a:tabLst>
             </a:pPr>
             <a:r>
-              <a:rPr lang="es-ES_tradnl" sz="2000" dirty="0" smtClean="0">
+              <a:rPr lang="es-ES_tradnl" sz="2000" dirty="0">
                 <a:latin typeface="Times New Roman" panose="02020603050405020304" pitchFamily="18" charset="0"/>
                 <a:ea typeface="Calibri"/>
                 <a:cs typeface="Times New Roman" panose="02020603050405020304" pitchFamily="18" charset="0"/>
@@ -8669,7 +9617,7 @@
               <a:t>¿</a:t>
             </a:r>
             <a:r>
-              <a:rPr lang="es-ES_tradnl" sz="2000" i="1" dirty="0" smtClean="0">
+              <a:rPr lang="es-ES_tradnl" sz="2000" i="1" dirty="0">
                 <a:latin typeface="Times New Roman" panose="02020603050405020304" pitchFamily="18" charset="0"/>
                 <a:ea typeface="Calibri"/>
                 <a:cs typeface="Times New Roman" panose="02020603050405020304" pitchFamily="18" charset="0"/>
@@ -8678,7 +9626,7 @@
               <a:t>me siento cómodo con este código</a:t>
             </a:r>
             <a:r>
-              <a:rPr lang="es-ES_tradnl" sz="2000" dirty="0" smtClean="0">
+              <a:rPr lang="es-ES_tradnl" sz="2000" dirty="0">
                 <a:latin typeface="Times New Roman" panose="02020603050405020304" pitchFamily="18" charset="0"/>
                 <a:ea typeface="Calibri"/>
                 <a:cs typeface="Times New Roman" panose="02020603050405020304" pitchFamily="18" charset="0"/>
@@ -8699,7 +9647,7 @@
               </a:tabLst>
             </a:pPr>
             <a:r>
-              <a:rPr lang="es-ES_tradnl" sz="2000" dirty="0" smtClean="0">
+              <a:rPr lang="es-ES_tradnl" sz="2000" dirty="0">
                 <a:latin typeface="Times New Roman" panose="02020603050405020304" pitchFamily="18" charset="0"/>
                 <a:ea typeface="Calibri"/>
                 <a:cs typeface="Times New Roman" panose="02020603050405020304" pitchFamily="18" charset="0"/>
@@ -8708,7 +9656,7 @@
               <a:t>¿</a:t>
             </a:r>
             <a:r>
-              <a:rPr lang="es-ES_tradnl" sz="2000" i="1" dirty="0" smtClean="0">
+              <a:rPr lang="es-ES_tradnl" sz="2000" i="1" dirty="0">
                 <a:latin typeface="Times New Roman" panose="02020603050405020304" pitchFamily="18" charset="0"/>
                 <a:ea typeface="Calibri"/>
                 <a:cs typeface="Times New Roman" panose="02020603050405020304" pitchFamily="18" charset="0"/>
@@ -8717,7 +9665,7 @@
               <a:t>cambiaría la implementación a objetos</a:t>
             </a:r>
             <a:r>
-              <a:rPr lang="es-ES_tradnl" sz="2000" dirty="0" smtClean="0">
+              <a:rPr lang="es-ES_tradnl" sz="2000" dirty="0">
                 <a:latin typeface="Times New Roman" panose="02020603050405020304" pitchFamily="18" charset="0"/>
                 <a:ea typeface="Calibri"/>
                 <a:cs typeface="Times New Roman" panose="02020603050405020304" pitchFamily="18" charset="0"/>
@@ -8738,7 +9686,7 @@
               </a:tabLst>
             </a:pPr>
             <a:r>
-              <a:rPr lang="es-ES_tradnl" sz="2000" dirty="0" smtClean="0">
+              <a:rPr lang="es-ES_tradnl" sz="2000" dirty="0">
                 <a:latin typeface="Times New Roman" panose="02020603050405020304" pitchFamily="18" charset="0"/>
                 <a:ea typeface="Calibri"/>
                 <a:cs typeface="Times New Roman" panose="02020603050405020304" pitchFamily="18" charset="0"/>
@@ -8747,7 +9695,7 @@
               <a:t>¿</a:t>
             </a:r>
             <a:r>
-              <a:rPr lang="es-ES_tradnl" sz="2000" i="1" dirty="0" smtClean="0">
+              <a:rPr lang="es-ES_tradnl" sz="2000" i="1" dirty="0">
                 <a:latin typeface="Times New Roman" panose="02020603050405020304" pitchFamily="18" charset="0"/>
                 <a:ea typeface="Calibri"/>
                 <a:cs typeface="Times New Roman" panose="02020603050405020304" pitchFamily="18" charset="0"/>
@@ -8756,7 +9704,7 @@
               <a:t>cambiaría la implementación con herencia</a:t>
             </a:r>
             <a:r>
-              <a:rPr lang="es-ES_tradnl" sz="2000" dirty="0" smtClean="0">
+              <a:rPr lang="es-ES_tradnl" sz="2000" dirty="0">
                 <a:latin typeface="Times New Roman" panose="02020603050405020304" pitchFamily="18" charset="0"/>
                 <a:ea typeface="Calibri"/>
                 <a:cs typeface="Times New Roman" panose="02020603050405020304" pitchFamily="18" charset="0"/>
@@ -8777,7 +9725,7 @@
               </a:tabLst>
             </a:pPr>
             <a:r>
-              <a:rPr lang="es-ES_tradnl" sz="2000" dirty="0" smtClean="0">
+              <a:rPr lang="es-ES_tradnl" sz="2000" dirty="0">
                 <a:latin typeface="Times New Roman" panose="02020603050405020304" pitchFamily="18" charset="0"/>
                 <a:ea typeface="Calibri"/>
                 <a:cs typeface="Times New Roman" panose="02020603050405020304" pitchFamily="18" charset="0"/>
@@ -8786,7 +9734,7 @@
               <a:t>¿</a:t>
             </a:r>
             <a:r>
-              <a:rPr lang="es-ES_tradnl" sz="2000" i="1" dirty="0" smtClean="0">
+              <a:rPr lang="es-ES_tradnl" sz="2000" i="1" dirty="0">
                 <a:latin typeface="Times New Roman" panose="02020603050405020304" pitchFamily="18" charset="0"/>
                 <a:ea typeface="Calibri"/>
                 <a:cs typeface="Times New Roman" panose="02020603050405020304" pitchFamily="18" charset="0"/>
@@ -8795,7 +9743,7 @@
               <a:t>es la mejor estructura de datos que se podría utilizar</a:t>
             </a:r>
             <a:r>
-              <a:rPr lang="es-ES_tradnl" sz="2000" dirty="0" smtClean="0">
+              <a:rPr lang="es-ES_tradnl" sz="2000" dirty="0">
                 <a:latin typeface="Times New Roman" panose="02020603050405020304" pitchFamily="18" charset="0"/>
                 <a:ea typeface="Calibri"/>
                 <a:cs typeface="Times New Roman" panose="02020603050405020304" pitchFamily="18" charset="0"/>
@@ -8819,7 +9767,7 @@
               </a:tabLst>
             </a:pPr>
             <a:r>
-              <a:rPr lang="es-ES_tradnl" sz="2400" dirty="0" smtClean="0">
+              <a:rPr lang="es-ES_tradnl" sz="2400" dirty="0">
                 <a:latin typeface="Times New Roman" panose="02020603050405020304" pitchFamily="18" charset="0"/>
                 <a:ea typeface="Calibri"/>
                 <a:cs typeface="Times New Roman" panose="02020603050405020304" pitchFamily="18" charset="0"/>
@@ -8840,47 +9788,14 @@
               </a:tabLst>
             </a:pPr>
             <a:r>
-              <a:rPr lang="es-ES_tradnl" sz="2000" dirty="0" smtClean="0">
+              <a:rPr lang="es-ES_tradnl" sz="2000" dirty="0">
                 <a:latin typeface="Times New Roman" panose="02020603050405020304" pitchFamily="18" charset="0"/>
                 <a:ea typeface="Calibri"/>
                 <a:cs typeface="Times New Roman" panose="02020603050405020304" pitchFamily="18" charset="0"/>
                 <a:sym typeface="Calibri"/>
               </a:rPr>
-              <a:t>Una función que dado un número </a:t>
-            </a:r>
-            <a:r>
-              <a:rPr lang="es-ES_tradnl" sz="2000" dirty="0" smtClean="0">
-                <a:latin typeface="Times New Roman" panose="02020603050405020304" pitchFamily="18" charset="0"/>
-                <a:ea typeface="Calibri"/>
-                <a:cs typeface="Times New Roman" panose="02020603050405020304" pitchFamily="18" charset="0"/>
-                <a:sym typeface="Calibri"/>
-              </a:rPr>
-              <a:t>normal </a:t>
-            </a:r>
-            <a:r>
-              <a:rPr lang="es-ES_tradnl" sz="2000" dirty="0" smtClean="0">
-                <a:latin typeface="Times New Roman" panose="02020603050405020304" pitchFamily="18" charset="0"/>
-                <a:ea typeface="Calibri"/>
-                <a:cs typeface="Times New Roman" panose="02020603050405020304" pitchFamily="18" charset="0"/>
-                <a:sym typeface="Calibri"/>
-              </a:rPr>
-              <a:t>lo convierta a un número </a:t>
-            </a:r>
-            <a:r>
-              <a:rPr lang="es-ES_tradnl" sz="2000" dirty="0" smtClean="0">
-                <a:latin typeface="Times New Roman" panose="02020603050405020304" pitchFamily="18" charset="0"/>
-                <a:ea typeface="Calibri"/>
-                <a:cs typeface="Times New Roman" panose="02020603050405020304" pitchFamily="18" charset="0"/>
-                <a:sym typeface="Calibri"/>
-              </a:rPr>
-              <a:t>romano.</a:t>
-            </a:r>
-            <a:endParaRPr lang="es-ES_tradnl" sz="2000" dirty="0" smtClean="0">
-              <a:latin typeface="Times New Roman" panose="02020603050405020304" pitchFamily="18" charset="0"/>
-              <a:ea typeface="Calibri"/>
-              <a:cs typeface="Times New Roman" panose="02020603050405020304" pitchFamily="18" charset="0"/>
-              <a:sym typeface="Calibri"/>
-            </a:endParaRPr>
+              <a:t>Una función que dado un número normal lo convierta a un número romano.</a:t>
+            </a:r>
           </a:p>
           <a:p>
             <a:pPr marL="380990" indent="-380990" algn="just">
@@ -8893,7 +9808,7 @@
                 <a:tab pos="480472" algn="l"/>
               </a:tabLst>
             </a:pPr>
-            <a:endParaRPr lang="es-ES_tradnl" sz="2000" dirty="0" smtClean="0">
+            <a:endParaRPr lang="es-ES_tradnl" sz="2000" dirty="0">
               <a:latin typeface="Calibri"/>
               <a:ea typeface="Calibri"/>
               <a:cs typeface="Calibri"/>
@@ -8951,7 +9866,7 @@
               <a:buSzPct val="25000"/>
             </a:pPr>
             <a:r>
-              <a:rPr lang="es" sz="4267" b="1" dirty="0" smtClean="0">
+              <a:rPr lang="es" sz="4267" b="1" dirty="0">
                 <a:solidFill>
                   <a:srgbClr val="00B0F0"/>
                 </a:solidFill>
@@ -8961,24 +9876,14 @@
               <a:t>Roman-Decimal </a:t>
             </a:r>
             <a:r>
-              <a:rPr lang="es" sz="2667" dirty="0" smtClean="0">
+              <a:rPr lang="es" sz="2667" dirty="0">
                 <a:solidFill>
                   <a:srgbClr val="00B0F0"/>
                 </a:solidFill>
                 <a:latin typeface="Times New Roman" panose="02020603050405020304" pitchFamily="18" charset="0"/>
                 <a:cs typeface="Times New Roman" panose="02020603050405020304" pitchFamily="18" charset="0"/>
               </a:rPr>
-              <a:t>(Consejos</a:t>
-            </a:r>
-            <a:r>
-              <a:rPr lang="es" sz="2667" dirty="0" smtClean="0">
-                <a:solidFill>
-                  <a:srgbClr val="00B0F0"/>
-                </a:solidFill>
-                <a:latin typeface="Times New Roman" panose="02020603050405020304" pitchFamily="18" charset="0"/>
-                <a:cs typeface="Times New Roman" panose="02020603050405020304" pitchFamily="18" charset="0"/>
-              </a:rPr>
-              <a:t>)</a:t>
+              <a:t>(Consejos)</a:t>
             </a:r>
             <a:endParaRPr lang="es" sz="1600" dirty="0">
               <a:solidFill>
@@ -9003,7 +9908,7 @@
 </p:sld>
 </file>
 
-<file path=ppt/slides/slide11.xml><?xml version="1.0" encoding="utf-8"?>
+<file path=ppt/slides/slide12.xml><?xml version="1.0" encoding="utf-8"?>
 <p:sld xmlns:a="http://schemas.openxmlformats.org/drawingml/2006/main" xmlns:r="http://schemas.openxmlformats.org/officeDocument/2006/relationships" xmlns:p="http://schemas.openxmlformats.org/presentationml/2006/main">
   <p:cSld>
     <p:spTree>
@@ -10572,6 +11477,404 @@
 <file path=ppt/slides/slide6.xml><?xml version="1.0" encoding="utf-8"?>
 <p:sld xmlns:a="http://schemas.openxmlformats.org/drawingml/2006/main" xmlns:r="http://schemas.openxmlformats.org/officeDocument/2006/relationships" xmlns:p="http://schemas.openxmlformats.org/presentationml/2006/main">
   <p:cSld>
+    <p:spTree>
+      <p:nvGrpSpPr>
+        <p:cNvPr id="1" name="Shape 194"/>
+        <p:cNvGrpSpPr/>
+        <p:nvPr/>
+      </p:nvGrpSpPr>
+      <p:grpSpPr>
+        <a:xfrm>
+          <a:off x="0" y="0"/>
+          <a:ext cx="0" cy="0"/>
+          <a:chOff x="0" y="0"/>
+          <a:chExt cx="0" cy="0"/>
+        </a:xfrm>
+      </p:grpSpPr>
+      <p:sp>
+        <p:nvSpPr>
+          <p:cNvPr id="5" name="Shape 195"/>
+          <p:cNvSpPr txBox="1">
+            <a:spLocks/>
+          </p:cNvSpPr>
+          <p:nvPr/>
+        </p:nvSpPr>
+        <p:spPr>
+          <a:xfrm>
+            <a:off x="609600" y="274635"/>
+            <a:ext cx="10972800" cy="686800"/>
+          </a:xfrm>
+          <a:prstGeom prst="rect">
+            <a:avLst/>
+          </a:prstGeom>
+          <a:noFill/>
+          <a:ln>
+            <a:noFill/>
+          </a:ln>
+        </p:spPr>
+        <p:txBody>
+          <a:bodyPr vert="horz" lIns="121900" tIns="60933" rIns="121900" bIns="60933" rtlCol="0" anchor="ctr" anchorCtr="0">
+            <a:noAutofit/>
+          </a:bodyPr>
+          <a:lstStyle>
+            <a:lvl1pPr algn="l" defTabSz="914400" rtl="0" eaLnBrk="1" latinLnBrk="0" hangingPunct="1">
+              <a:lnSpc>
+                <a:spcPct val="90000"/>
+              </a:lnSpc>
+              <a:spcBef>
+                <a:spcPct val="0"/>
+              </a:spcBef>
+              <a:buNone/>
+              <a:defRPr lang="pt-PT" sz="2600" kern="1200">
+                <a:solidFill>
+                  <a:schemeClr val="tx2"/>
+                </a:solidFill>
+                <a:latin typeface="Verdana" panose="020B0604030504040204" pitchFamily="34" charset="0"/>
+                <a:ea typeface="Verdana" panose="020B0604030504040204" pitchFamily="34" charset="0"/>
+                <a:cs typeface="Verdana" panose="020B0604030504040204" pitchFamily="34" charset="0"/>
+              </a:defRPr>
+            </a:lvl1pPr>
+          </a:lstStyle>
+          <a:p>
+            <a:pPr>
+              <a:buSzPct val="25000"/>
+            </a:pPr>
+            <a:r>
+              <a:rPr lang="es" sz="4267" b="1" dirty="0">
+                <a:solidFill>
+                  <a:srgbClr val="00B0F0"/>
+                </a:solidFill>
+                <a:latin typeface="Calibri" panose="020F0502020204030204" pitchFamily="34" charset="0"/>
+                <a:cs typeface="Calibri" panose="020F0502020204030204" pitchFamily="34" charset="0"/>
+              </a:rPr>
+              <a:t>Antes de empezar </a:t>
+            </a:r>
+            <a:r>
+              <a:rPr lang="es" sz="2667" dirty="0">
+                <a:solidFill>
+                  <a:srgbClr val="00B0F0"/>
+                </a:solidFill>
+                <a:latin typeface="Calibri" panose="020F0502020204030204" pitchFamily="34" charset="0"/>
+                <a:cs typeface="Calibri" panose="020F0502020204030204" pitchFamily="34" charset="0"/>
+              </a:rPr>
+              <a:t>(¿Cu</a:t>
+            </a:r>
+            <a:r>
+              <a:rPr lang="es-ES" sz="2667" dirty="0">
+                <a:solidFill>
+                  <a:srgbClr val="00B0F0"/>
+                </a:solidFill>
+                <a:latin typeface="Calibri" panose="020F0502020204030204" pitchFamily="34" charset="0"/>
+                <a:cs typeface="Calibri" panose="020F0502020204030204" pitchFamily="34" charset="0"/>
+              </a:rPr>
+              <a:t>á</a:t>
+            </a:r>
+            <a:r>
+              <a:rPr lang="es" sz="2667" dirty="0">
+                <a:solidFill>
+                  <a:srgbClr val="00B0F0"/>
+                </a:solidFill>
+                <a:latin typeface="Calibri" panose="020F0502020204030204" pitchFamily="34" charset="0"/>
+                <a:cs typeface="Calibri" panose="020F0502020204030204" pitchFamily="34" charset="0"/>
+              </a:rPr>
+              <a:t>ndo refactorizamos?)</a:t>
+            </a:r>
+            <a:endParaRPr lang="es" sz="1600" dirty="0">
+              <a:solidFill>
+                <a:srgbClr val="00B0F0"/>
+              </a:solidFill>
+              <a:latin typeface="Calibri" panose="020F0502020204030204" pitchFamily="34" charset="0"/>
+              <a:cs typeface="Calibri" panose="020F0502020204030204" pitchFamily="34" charset="0"/>
+            </a:endParaRPr>
+          </a:p>
+        </p:txBody>
+      </p:sp>
+      <p:sp>
+        <p:nvSpPr>
+          <p:cNvPr id="8" name="Rectangle 7"/>
+          <p:cNvSpPr/>
+          <p:nvPr/>
+        </p:nvSpPr>
+        <p:spPr>
+          <a:xfrm>
+            <a:off x="7465569" y="6021288"/>
+            <a:ext cx="4616970" cy="338554"/>
+          </a:xfrm>
+          <a:prstGeom prst="rect">
+            <a:avLst/>
+          </a:prstGeom>
+        </p:spPr>
+        <p:txBody>
+          <a:bodyPr wrap="none">
+            <a:spAutoFit/>
+          </a:bodyPr>
+          <a:lstStyle/>
+          <a:p>
+            <a:r>
+              <a:rPr lang="es-ES_tradnl" sz="1600" u="sng" dirty="0">
+                <a:solidFill>
+                  <a:srgbClr val="FF0000"/>
+                </a:solidFill>
+              </a:rPr>
+              <a:t>https://refactoring.guru/refactoring/smells</a:t>
+            </a:r>
+          </a:p>
+        </p:txBody>
+      </p:sp>
+      <p:pic>
+        <p:nvPicPr>
+          <p:cNvPr id="6" name="Picture 5">
+            <a:extLst>
+              <a:ext uri="{FF2B5EF4-FFF2-40B4-BE49-F238E27FC236}">
+                <a16:creationId xmlns:a16="http://schemas.microsoft.com/office/drawing/2014/main" id="{1A22E21F-E179-4A05-9084-0C17F6809DC6}"/>
+              </a:ext>
+            </a:extLst>
+          </p:cNvPr>
+          <p:cNvPicPr>
+            <a:picLocks noChangeAspect="1"/>
+          </p:cNvPicPr>
+          <p:nvPr/>
+        </p:nvPicPr>
+        <p:blipFill>
+          <a:blip r:embed="rId3">
+            <a:duotone>
+              <a:schemeClr val="accent3">
+                <a:shade val="45000"/>
+                <a:satMod val="135000"/>
+              </a:schemeClr>
+              <a:prstClr val="white"/>
+            </a:duotone>
+          </a:blip>
+          <a:stretch>
+            <a:fillRect/>
+          </a:stretch>
+        </p:blipFill>
+        <p:spPr>
+          <a:xfrm>
+            <a:off x="5104612" y="1016944"/>
+            <a:ext cx="1908000" cy="1908000"/>
+          </a:xfrm>
+          <a:prstGeom prst="rect">
+            <a:avLst/>
+          </a:prstGeom>
+        </p:spPr>
+      </p:pic>
+      <p:pic>
+        <p:nvPicPr>
+          <p:cNvPr id="9" name="Picture 8">
+            <a:extLst>
+              <a:ext uri="{FF2B5EF4-FFF2-40B4-BE49-F238E27FC236}">
+                <a16:creationId xmlns:a16="http://schemas.microsoft.com/office/drawing/2014/main" id="{C521F2A1-3C9D-4961-9B1D-E55E5FA6A758}"/>
+              </a:ext>
+            </a:extLst>
+          </p:cNvPr>
+          <p:cNvPicPr>
+            <a:picLocks noChangeAspect="1"/>
+          </p:cNvPicPr>
+          <p:nvPr/>
+        </p:nvPicPr>
+        <p:blipFill>
+          <a:blip r:embed="rId4">
+            <a:duotone>
+              <a:schemeClr val="accent3">
+                <a:shade val="45000"/>
+                <a:satMod val="135000"/>
+              </a:schemeClr>
+              <a:prstClr val="white"/>
+            </a:duotone>
+          </a:blip>
+          <a:stretch>
+            <a:fillRect/>
+          </a:stretch>
+        </p:blipFill>
+        <p:spPr>
+          <a:xfrm>
+            <a:off x="9287590" y="2708920"/>
+            <a:ext cx="1876199" cy="1908000"/>
+          </a:xfrm>
+          <a:prstGeom prst="rect">
+            <a:avLst/>
+          </a:prstGeom>
+        </p:spPr>
+      </p:pic>
+      <p:pic>
+        <p:nvPicPr>
+          <p:cNvPr id="11" name="Picture 10">
+            <a:extLst>
+              <a:ext uri="{FF2B5EF4-FFF2-40B4-BE49-F238E27FC236}">
+                <a16:creationId xmlns:a16="http://schemas.microsoft.com/office/drawing/2014/main" id="{5DB18E9F-AC61-43F3-A5E4-F8B63845F31A}"/>
+              </a:ext>
+            </a:extLst>
+          </p:cNvPr>
+          <p:cNvPicPr>
+            <a:picLocks noChangeAspect="1"/>
+          </p:cNvPicPr>
+          <p:nvPr/>
+        </p:nvPicPr>
+        <p:blipFill>
+          <a:blip r:embed="rId5">
+            <a:duotone>
+              <a:schemeClr val="accent3">
+                <a:shade val="45000"/>
+                <a:satMod val="135000"/>
+              </a:schemeClr>
+              <a:prstClr val="white"/>
+            </a:duotone>
+          </a:blip>
+          <a:stretch>
+            <a:fillRect/>
+          </a:stretch>
+        </p:blipFill>
+        <p:spPr>
+          <a:xfrm>
+            <a:off x="4945281" y="2750070"/>
+            <a:ext cx="2194201" cy="1908000"/>
+          </a:xfrm>
+          <a:prstGeom prst="rect">
+            <a:avLst/>
+          </a:prstGeom>
+        </p:spPr>
+      </p:pic>
+      <p:pic>
+        <p:nvPicPr>
+          <p:cNvPr id="12" name="Picture 11">
+            <a:extLst>
+              <a:ext uri="{FF2B5EF4-FFF2-40B4-BE49-F238E27FC236}">
+                <a16:creationId xmlns:a16="http://schemas.microsoft.com/office/drawing/2014/main" id="{B0449C82-2227-456E-AC33-73FB5A4D7B34}"/>
+              </a:ext>
+            </a:extLst>
+          </p:cNvPr>
+          <p:cNvPicPr>
+            <a:picLocks noChangeAspect="1"/>
+          </p:cNvPicPr>
+          <p:nvPr/>
+        </p:nvPicPr>
+        <p:blipFill>
+          <a:blip r:embed="rId6">
+            <a:duotone>
+              <a:schemeClr val="accent3">
+                <a:shade val="45000"/>
+                <a:satMod val="135000"/>
+              </a:schemeClr>
+              <a:prstClr val="white"/>
+            </a:duotone>
+          </a:blip>
+          <a:stretch>
+            <a:fillRect/>
+          </a:stretch>
+        </p:blipFill>
+        <p:spPr>
+          <a:xfrm>
+            <a:off x="815413" y="2708920"/>
+            <a:ext cx="2003402" cy="1908000"/>
+          </a:xfrm>
+          <a:prstGeom prst="rect">
+            <a:avLst/>
+          </a:prstGeom>
+        </p:spPr>
+      </p:pic>
+      <p:sp>
+        <p:nvSpPr>
+          <p:cNvPr id="13" name="Shape 196">
+            <a:extLst>
+              <a:ext uri="{FF2B5EF4-FFF2-40B4-BE49-F238E27FC236}">
+                <a16:creationId xmlns:a16="http://schemas.microsoft.com/office/drawing/2014/main" id="{B0DD7B45-6F7F-4005-B2BE-16B5E8C35C23}"/>
+              </a:ext>
+            </a:extLst>
+          </p:cNvPr>
+          <p:cNvSpPr txBox="1"/>
+          <p:nvPr/>
+        </p:nvSpPr>
+        <p:spPr>
+          <a:xfrm>
+            <a:off x="1271464" y="4935159"/>
+            <a:ext cx="9649072" cy="582073"/>
+          </a:xfrm>
+          <a:prstGeom prst="roundRect">
+            <a:avLst>
+              <a:gd name="adj" fmla="val 50000"/>
+            </a:avLst>
+          </a:prstGeom>
+          <a:ln>
+            <a:noFill/>
+          </a:ln>
+        </p:spPr>
+        <p:style>
+          <a:lnRef idx="2">
+            <a:schemeClr val="accent2">
+              <a:shade val="50000"/>
+            </a:schemeClr>
+          </a:lnRef>
+          <a:fillRef idx="1">
+            <a:schemeClr val="accent2"/>
+          </a:fillRef>
+          <a:effectRef idx="0">
+            <a:schemeClr val="accent2"/>
+          </a:effectRef>
+          <a:fontRef idx="minor">
+            <a:schemeClr val="lt1"/>
+          </a:fontRef>
+        </p:style>
+        <p:txBody>
+          <a:bodyPr lIns="121900" tIns="60933" rIns="121900" bIns="60933" anchor="t" anchorCtr="0">
+            <a:noAutofit/>
+          </a:bodyPr>
+          <a:lstStyle/>
+          <a:p>
+            <a:pPr algn="ctr">
+              <a:spcBef>
+                <a:spcPts val="533"/>
+              </a:spcBef>
+              <a:tabLst>
+                <a:tab pos="480472" algn="l"/>
+              </a:tabLst>
+            </a:pPr>
+            <a:r>
+              <a:rPr lang="es-ES" dirty="0">
+                <a:latin typeface="Calibri"/>
+                <a:ea typeface="Calibri"/>
+                <a:cs typeface="Calibri"/>
+                <a:sym typeface="Calibri"/>
+              </a:rPr>
+              <a:t>La regla del </a:t>
+            </a:r>
+            <a:r>
+              <a:rPr lang="es-ES" dirty="0" err="1">
+                <a:latin typeface="Calibri"/>
+                <a:ea typeface="Calibri"/>
+                <a:cs typeface="Calibri"/>
+                <a:sym typeface="Calibri"/>
+              </a:rPr>
+              <a:t>Boy</a:t>
+            </a:r>
+            <a:r>
+              <a:rPr lang="es-ES" dirty="0">
+                <a:latin typeface="Calibri"/>
+                <a:ea typeface="Calibri"/>
+                <a:cs typeface="Calibri"/>
+                <a:sym typeface="Calibri"/>
+              </a:rPr>
+              <a:t> Scout: “Siempre deja el lugar de acampada más limpio que como lo encontraste”.</a:t>
+            </a:r>
+          </a:p>
+        </p:txBody>
+      </p:sp>
+    </p:spTree>
+    <p:extLst>
+      <p:ext uri="{BB962C8B-B14F-4D97-AF65-F5344CB8AC3E}">
+        <p14:creationId xmlns:p14="http://schemas.microsoft.com/office/powerpoint/2010/main" val="2352976099"/>
+      </p:ext>
+    </p:extLst>
+  </p:cSld>
+  <p:clrMapOvr>
+    <a:masterClrMapping/>
+  </p:clrMapOvr>
+</p:sld>
+</file>
+
+<file path=ppt/slides/slide7.xml><?xml version="1.0" encoding="utf-8"?>
+<p:sld xmlns:a="http://schemas.openxmlformats.org/drawingml/2006/main" xmlns:r="http://schemas.openxmlformats.org/officeDocument/2006/relationships" xmlns:p="http://schemas.openxmlformats.org/presentationml/2006/main">
+  <p:cSld>
     <p:bg>
       <p:bgPr>
         <a:solidFill>
@@ -10899,7 +12202,7 @@
               <a:buSzPct val="25000"/>
             </a:pPr>
             <a:r>
-              <a:rPr lang="es" sz="6000" dirty="0" smtClean="0">
+              <a:rPr lang="es" sz="6000" dirty="0">
                 <a:solidFill>
                   <a:srgbClr val="002060"/>
                 </a:solidFill>
@@ -10909,7 +12212,7 @@
               <a:t>Kata: </a:t>
             </a:r>
             <a:r>
-              <a:rPr lang="en-US" sz="6000" dirty="0" smtClean="0">
+              <a:rPr lang="en-US" sz="6000" dirty="0">
                 <a:solidFill>
                   <a:srgbClr val="002060"/>
                 </a:solidFill>
@@ -10941,7 +12244,7 @@
 </p:sld>
 </file>
 
-<file path=ppt/slides/slide7.xml><?xml version="1.0" encoding="utf-8"?>
+<file path=ppt/slides/slide8.xml><?xml version="1.0" encoding="utf-8"?>
 <p:sld xmlns:a="http://schemas.openxmlformats.org/drawingml/2006/main" xmlns:r="http://schemas.openxmlformats.org/officeDocument/2006/relationships" xmlns:p="http://schemas.openxmlformats.org/presentationml/2006/main">
   <p:cSld>
     <p:spTree>
@@ -10992,7 +12295,7 @@
               </a:tabLst>
             </a:pPr>
             <a:r>
-              <a:rPr lang="es-ES" sz="2000" dirty="0" smtClean="0">
+              <a:rPr lang="es-ES" sz="2000" dirty="0">
                 <a:latin typeface="Times New Roman" panose="02020603050405020304" pitchFamily="18" charset="0"/>
                 <a:ea typeface="Calibri"/>
                 <a:cs typeface="Times New Roman" panose="02020603050405020304" pitchFamily="18" charset="0"/>
@@ -11011,7 +12314,7 @@
               </a:tabLst>
             </a:pPr>
             <a:r>
-              <a:rPr lang="es-ES" sz="2000" dirty="0" smtClean="0">
+              <a:rPr lang="es-ES" sz="2000" dirty="0">
                 <a:latin typeface="Times New Roman" panose="02020603050405020304" pitchFamily="18" charset="0"/>
                 <a:ea typeface="Calibri"/>
                 <a:cs typeface="Times New Roman" panose="02020603050405020304" pitchFamily="18" charset="0"/>
@@ -11030,7 +12333,7 @@
               </a:tabLst>
             </a:pPr>
             <a:r>
-              <a:rPr lang="es-ES" sz="2000" dirty="0" smtClean="0">
+              <a:rPr lang="es-ES" sz="2000" dirty="0">
                 <a:latin typeface="Times New Roman" panose="02020603050405020304" pitchFamily="18" charset="0"/>
                 <a:ea typeface="Calibri"/>
                 <a:cs typeface="Times New Roman" panose="02020603050405020304" pitchFamily="18" charset="0"/>
@@ -11106,7 +12409,7 @@
               <a:buSzPct val="25000"/>
             </a:pPr>
             <a:r>
-              <a:rPr lang="es" sz="4267" b="1" dirty="0" smtClean="0">
+              <a:rPr lang="es" sz="4267" b="1" dirty="0">
                 <a:solidFill>
                   <a:srgbClr val="00B0F0"/>
                 </a:solidFill>
@@ -11116,24 +12419,14 @@
               <a:t>Roman-Decimal </a:t>
             </a:r>
             <a:r>
-              <a:rPr lang="es" sz="2667" dirty="0" smtClean="0">
+              <a:rPr lang="es" sz="2667" dirty="0">
                 <a:solidFill>
                   <a:srgbClr val="00B0F0"/>
                 </a:solidFill>
                 <a:latin typeface="Times New Roman" panose="02020603050405020304" pitchFamily="18" charset="0"/>
                 <a:cs typeface="Times New Roman" panose="02020603050405020304" pitchFamily="18" charset="0"/>
               </a:rPr>
-              <a:t>(Enunciado</a:t>
-            </a:r>
-            <a:r>
-              <a:rPr lang="es" sz="2667" dirty="0">
-                <a:solidFill>
-                  <a:srgbClr val="00B0F0"/>
-                </a:solidFill>
-                <a:latin typeface="Times New Roman" panose="02020603050405020304" pitchFamily="18" charset="0"/>
-                <a:cs typeface="Times New Roman" panose="02020603050405020304" pitchFamily="18" charset="0"/>
-              </a:rPr>
-              <a:t>)</a:t>
+              <a:t>(Enunciado)</a:t>
             </a:r>
             <a:endParaRPr lang="es" sz="1600" dirty="0">
               <a:solidFill>
@@ -11195,7 +12488,7 @@
           <a:p>
             <a:pPr algn="r"/>
             <a:r>
-              <a:rPr lang="es-ES" sz="1100" dirty="0" err="1" smtClean="0">
+              <a:rPr lang="es-ES" sz="1100" dirty="0" err="1">
                 <a:latin typeface="Times New Roman" panose="02020603050405020304" pitchFamily="18" charset="0"/>
                 <a:cs typeface="Times New Roman" panose="02020603050405020304" pitchFamily="18" charset="0"/>
               </a:rPr>
@@ -11214,27 +12507,15 @@
                 <a:cs typeface="Times New Roman" panose="02020603050405020304" pitchFamily="18" charset="0"/>
                 <a:hlinkClick r:id="rId4"/>
               </a:rPr>
-              <a:t>https://</a:t>
-            </a:r>
-            <a:r>
-              <a:rPr lang="es-ES" sz="1100" dirty="0" smtClean="0">
+              <a:t>https://www.giters.com/millancore/php-study/issues/6</a:t>
+            </a:r>
+            <a:r>
+              <a:rPr lang="es-ES" sz="1100" dirty="0">
                 <a:latin typeface="Times New Roman" panose="02020603050405020304" pitchFamily="18" charset="0"/>
                 <a:cs typeface="Times New Roman" panose="02020603050405020304" pitchFamily="18" charset="0"/>
-                <a:hlinkClick r:id="rId4"/>
-              </a:rPr>
-              <a:t>www.giters.com/millancore/php-study/issues/6</a:t>
-            </a:r>
-            <a:r>
-              <a:rPr lang="es-ES" sz="1100" dirty="0" smtClean="0">
-                <a:latin typeface="Times New Roman" panose="02020603050405020304" pitchFamily="18" charset="0"/>
-                <a:cs typeface="Times New Roman" panose="02020603050405020304" pitchFamily="18" charset="0"/>
               </a:rPr>
               <a:t> </a:t>
             </a:r>
-            <a:endParaRPr lang="es-ES" sz="1100" dirty="0">
-              <a:latin typeface="Times New Roman" panose="02020603050405020304" pitchFamily="18" charset="0"/>
-              <a:cs typeface="Times New Roman" panose="02020603050405020304" pitchFamily="18" charset="0"/>
-            </a:endParaRPr>
           </a:p>
         </p:txBody>
       </p:sp>
@@ -11251,7 +12532,7 @@
 </p:sld>
 </file>
 
-<file path=ppt/slides/slide8.xml><?xml version="1.0" encoding="utf-8"?>
+<file path=ppt/slides/slide9.xml><?xml version="1.0" encoding="utf-8"?>
 <p:sld xmlns:a="http://schemas.openxmlformats.org/drawingml/2006/main" xmlns:r="http://schemas.openxmlformats.org/officeDocument/2006/relationships" xmlns:p="http://schemas.openxmlformats.org/presentationml/2006/main">
   <p:cSld>
     <p:spTree>
@@ -11308,16 +12589,7 @@
                 <a:cs typeface="Times New Roman" panose="02020603050405020304" pitchFamily="18" charset="0"/>
                 <a:sym typeface="Calibri"/>
               </a:rPr>
-              <a:t>En esta Kata se debería escribir una función para convertir de números romanos a números decimales. </a:t>
-            </a:r>
-            <a:r>
-              <a:rPr lang="es-ES_tradnl" sz="2000" dirty="0" smtClean="0">
-                <a:latin typeface="Times New Roman" panose="02020603050405020304" pitchFamily="18" charset="0"/>
-                <a:ea typeface="Calibri"/>
-                <a:cs typeface="Times New Roman" panose="02020603050405020304" pitchFamily="18" charset="0"/>
-                <a:sym typeface="Calibri"/>
-              </a:rPr>
-              <a:t>Por ejemplo:</a:t>
+              <a:t>En esta Kata se debería escribir una función para convertir de números romanos a números decimales. Por ejemplo:</a:t>
             </a:r>
           </a:p>
           <a:p>
@@ -11329,7 +12601,7 @@
                 <a:tab pos="480472" algn="l"/>
               </a:tabLst>
             </a:pPr>
-            <a:endParaRPr lang="es-ES_tradnl" sz="2000" dirty="0" smtClean="0">
+            <a:endParaRPr lang="es-ES_tradnl" sz="2000" dirty="0">
               <a:latin typeface="Times New Roman" panose="02020603050405020304" pitchFamily="18" charset="0"/>
               <a:ea typeface="Calibri"/>
               <a:cs typeface="Times New Roman" panose="02020603050405020304" pitchFamily="18" charset="0"/>
@@ -11345,7 +12617,7 @@
                 <a:tab pos="480472" algn="l"/>
               </a:tabLst>
             </a:pPr>
-            <a:endParaRPr lang="es-ES_tradnl" sz="2000" dirty="0" smtClean="0">
+            <a:endParaRPr lang="es-ES_tradnl" sz="2000" dirty="0">
               <a:latin typeface="Times New Roman" panose="02020603050405020304" pitchFamily="18" charset="0"/>
               <a:ea typeface="Calibri"/>
               <a:cs typeface="Times New Roman" panose="02020603050405020304" pitchFamily="18" charset="0"/>
@@ -11361,7 +12633,7 @@
                 <a:tab pos="480472" algn="l"/>
               </a:tabLst>
             </a:pPr>
-            <a:endParaRPr lang="es-ES_tradnl" sz="2000" dirty="0" smtClean="0">
+            <a:endParaRPr lang="es-ES_tradnl" sz="2000" dirty="0">
               <a:latin typeface="Times New Roman" panose="02020603050405020304" pitchFamily="18" charset="0"/>
               <a:ea typeface="Calibri"/>
               <a:cs typeface="Times New Roman" panose="02020603050405020304" pitchFamily="18" charset="0"/>
@@ -11377,7 +12649,7 @@
                 <a:tab pos="480472" algn="l"/>
               </a:tabLst>
             </a:pPr>
-            <a:endParaRPr lang="es-ES_tradnl" sz="2000" dirty="0" smtClean="0">
+            <a:endParaRPr lang="es-ES_tradnl" sz="2000" dirty="0">
               <a:latin typeface="Times New Roman" panose="02020603050405020304" pitchFamily="18" charset="0"/>
               <a:ea typeface="Calibri"/>
               <a:cs typeface="Times New Roman" panose="02020603050405020304" pitchFamily="18" charset="0"/>
@@ -11394,7 +12666,7 @@
               </a:tabLst>
             </a:pPr>
             <a:r>
-              <a:rPr lang="es-ES" sz="2000" dirty="0" smtClean="0">
+              <a:rPr lang="es-ES" sz="2000" dirty="0">
                 <a:latin typeface="Times New Roman" panose="02020603050405020304" pitchFamily="18" charset="0"/>
                 <a:ea typeface="Calibri"/>
                 <a:cs typeface="Times New Roman" panose="02020603050405020304" pitchFamily="18" charset="0"/>
@@ -11413,7 +12685,7 @@
               </a:tabLst>
             </a:pPr>
             <a:r>
-              <a:rPr lang="es-ES" sz="2000" dirty="0" smtClean="0">
+              <a:rPr lang="es-ES" sz="2000" dirty="0">
                 <a:latin typeface="Times New Roman" panose="02020603050405020304" pitchFamily="18" charset="0"/>
                 <a:ea typeface="Calibri"/>
                 <a:cs typeface="Times New Roman" panose="02020603050405020304" pitchFamily="18" charset="0"/>
@@ -11432,7 +12704,7 @@
               </a:tabLst>
             </a:pPr>
             <a:r>
-              <a:rPr lang="es-ES" sz="2000" dirty="0" smtClean="0">
+              <a:rPr lang="es-ES" sz="2000" dirty="0">
                 <a:latin typeface="Times New Roman" panose="02020603050405020304" pitchFamily="18" charset="0"/>
                 <a:ea typeface="Calibri"/>
                 <a:cs typeface="Times New Roman" panose="02020603050405020304" pitchFamily="18" charset="0"/>
@@ -11451,7 +12723,7 @@
               </a:tabLst>
             </a:pPr>
             <a:r>
-              <a:rPr lang="es-ES" sz="2000" dirty="0" smtClean="0">
+              <a:rPr lang="es-ES" sz="2000" dirty="0">
                 <a:latin typeface="Times New Roman" panose="02020603050405020304" pitchFamily="18" charset="0"/>
                 <a:ea typeface="Calibri"/>
                 <a:cs typeface="Times New Roman" panose="02020603050405020304" pitchFamily="18" charset="0"/>
@@ -11460,7 +12732,7 @@
               <a:t>	En los números romanos 1990 se representa como: 1000=M, 900=CM, 90=XC </a:t>
             </a:r>
             <a:r>
-              <a:rPr lang="es-ES" sz="2000" dirty="0" smtClean="0">
+              <a:rPr lang="es-ES" sz="2000" dirty="0">
                 <a:latin typeface="Times New Roman" panose="02020603050405020304" pitchFamily="18" charset="0"/>
                 <a:ea typeface="Calibri"/>
                 <a:cs typeface="Times New Roman" panose="02020603050405020304" pitchFamily="18" charset="0"/>
@@ -11469,7 +12741,7 @@
               <a:t></a:t>
             </a:r>
             <a:r>
-              <a:rPr lang="es-ES" sz="2000" dirty="0" smtClean="0">
+              <a:rPr lang="es-ES" sz="2000" dirty="0">
                 <a:latin typeface="Times New Roman" panose="02020603050405020304" pitchFamily="18" charset="0"/>
                 <a:ea typeface="Calibri"/>
                 <a:cs typeface="Times New Roman" panose="02020603050405020304" pitchFamily="18" charset="0"/>
@@ -11488,7 +12760,7 @@
               </a:tabLst>
             </a:pPr>
             <a:r>
-              <a:rPr lang="es-ES" sz="2000" dirty="0" smtClean="0">
+              <a:rPr lang="es-ES" sz="2000" dirty="0">
                 <a:latin typeface="Times New Roman" panose="02020603050405020304" pitchFamily="18" charset="0"/>
                 <a:ea typeface="Calibri"/>
                 <a:cs typeface="Times New Roman" panose="02020603050405020304" pitchFamily="18" charset="0"/>
@@ -11497,7 +12769,7 @@
               <a:t>	En los números romanos 2008 se representa como: 2000=MM, 8=VIII </a:t>
             </a:r>
             <a:r>
-              <a:rPr lang="es-ES" sz="2000" dirty="0" smtClean="0">
+              <a:rPr lang="es-ES" sz="2000" dirty="0">
                 <a:latin typeface="Times New Roman" panose="02020603050405020304" pitchFamily="18" charset="0"/>
                 <a:ea typeface="Calibri"/>
                 <a:cs typeface="Times New Roman" panose="02020603050405020304" pitchFamily="18" charset="0"/>
@@ -11506,7 +12778,7 @@
               <a:t></a:t>
             </a:r>
             <a:r>
-              <a:rPr lang="es-ES" sz="2000" dirty="0" smtClean="0">
+              <a:rPr lang="es-ES" sz="2000" dirty="0">
                 <a:latin typeface="Times New Roman" panose="02020603050405020304" pitchFamily="18" charset="0"/>
                 <a:ea typeface="Calibri"/>
                 <a:cs typeface="Times New Roman" panose="02020603050405020304" pitchFamily="18" charset="0"/>
@@ -11572,7 +12844,7 @@
               <a:buSzPct val="25000"/>
             </a:pPr>
             <a:r>
-              <a:rPr lang="es" sz="4267" b="1" dirty="0" smtClean="0">
+              <a:rPr lang="es" sz="4267" b="1" dirty="0">
                 <a:solidFill>
                   <a:srgbClr val="00B0F0"/>
                 </a:solidFill>
@@ -11582,24 +12854,14 @@
               <a:t>Roman-Decimal </a:t>
             </a:r>
             <a:r>
-              <a:rPr lang="es" sz="2667" dirty="0" smtClean="0">
+              <a:rPr lang="es" sz="2667" dirty="0">
                 <a:solidFill>
                   <a:srgbClr val="00B0F0"/>
                 </a:solidFill>
                 <a:latin typeface="Times New Roman" panose="02020603050405020304" pitchFamily="18" charset="0"/>
                 <a:cs typeface="Times New Roman" panose="02020603050405020304" pitchFamily="18" charset="0"/>
               </a:rPr>
-              <a:t>(Enunciado</a:t>
-            </a:r>
-            <a:r>
-              <a:rPr lang="es" sz="2667" dirty="0">
-                <a:solidFill>
-                  <a:srgbClr val="00B0F0"/>
-                </a:solidFill>
-                <a:latin typeface="Times New Roman" panose="02020603050405020304" pitchFamily="18" charset="0"/>
-                <a:cs typeface="Times New Roman" panose="02020603050405020304" pitchFamily="18" charset="0"/>
-              </a:rPr>
-              <a:t>)</a:t>
+              <a:t>(Enunciado)</a:t>
             </a:r>
             <a:endParaRPr lang="es" sz="1600" dirty="0">
               <a:solidFill>
@@ -11656,7 +12918,7 @@
               </a:tabLst>
             </a:pPr>
             <a:r>
-              <a:rPr lang="es-ES_tradnl" sz="1600" dirty="0" smtClean="0">
+              <a:rPr lang="es-ES_tradnl" sz="1600" dirty="0">
                 <a:latin typeface="Times New Roman" pitchFamily="18" charset="0"/>
                 <a:ea typeface="Calibri"/>
                 <a:cs typeface="Times New Roman" pitchFamily="18" charset="0"/>
@@ -11665,7 +12927,7 @@
               <a:t>1 </a:t>
             </a:r>
             <a:r>
-              <a:rPr lang="es-ES_tradnl" sz="1600" dirty="0" smtClean="0">
+              <a:rPr lang="es-ES_tradnl" sz="1600" dirty="0">
                 <a:latin typeface="Times New Roman" pitchFamily="18" charset="0"/>
                 <a:ea typeface="Calibri"/>
                 <a:cs typeface="Times New Roman" pitchFamily="18" charset="0"/>
@@ -11684,7 +12946,7 @@
               </a:tabLst>
             </a:pPr>
             <a:r>
-              <a:rPr lang="es-ES_tradnl" sz="1600" dirty="0" smtClean="0">
+              <a:rPr lang="es-ES_tradnl" sz="1600" dirty="0">
                 <a:latin typeface="Times New Roman" pitchFamily="18" charset="0"/>
                 <a:ea typeface="Calibri"/>
                 <a:cs typeface="Times New Roman" pitchFamily="18" charset="0"/>
@@ -11703,7 +12965,7 @@
               </a:tabLst>
             </a:pPr>
             <a:r>
-              <a:rPr lang="es-ES_tradnl" sz="1600" dirty="0" smtClean="0">
+              <a:rPr lang="es-ES_tradnl" sz="1600" dirty="0">
                 <a:latin typeface="Times New Roman" pitchFamily="18" charset="0"/>
                 <a:ea typeface="Calibri"/>
                 <a:cs typeface="Times New Roman" pitchFamily="18" charset="0"/>
@@ -11722,7 +12984,7 @@
               </a:tabLst>
             </a:pPr>
             <a:r>
-              <a:rPr lang="es-ES_tradnl" sz="1600" dirty="0" smtClean="0">
+              <a:rPr lang="es-ES_tradnl" sz="1600" dirty="0">
                 <a:latin typeface="Times New Roman" pitchFamily="18" charset="0"/>
                 <a:ea typeface="Calibri"/>
                 <a:cs typeface="Times New Roman" pitchFamily="18" charset="0"/>
@@ -11782,7 +13044,7 @@
               </a:tabLst>
             </a:pPr>
             <a:r>
-              <a:rPr lang="es-ES_tradnl" sz="1600" dirty="0" smtClean="0">
+              <a:rPr lang="es-ES_tradnl" sz="1600" dirty="0">
                 <a:latin typeface="Times New Roman" pitchFamily="18" charset="0"/>
                 <a:ea typeface="Calibri"/>
                 <a:cs typeface="Times New Roman" pitchFamily="18" charset="0"/>
@@ -11791,29 +13053,14 @@
               <a:t>I </a:t>
             </a:r>
             <a:r>
-              <a:rPr lang="es-ES_tradnl" sz="1600" dirty="0" smtClean="0">
+              <a:rPr lang="es-ES_tradnl" sz="1600" dirty="0">
                 <a:latin typeface="Times New Roman" pitchFamily="18" charset="0"/>
                 <a:ea typeface="Calibri"/>
                 <a:cs typeface="Times New Roman" pitchFamily="18" charset="0"/>
                 <a:sym typeface="Wingdings" pitchFamily="2" charset="2"/>
               </a:rPr>
-              <a:t> </a:t>
-            </a:r>
-            <a:r>
-              <a:rPr lang="es-ES_tradnl" sz="1600" dirty="0" smtClean="0">
-                <a:latin typeface="Times New Roman" pitchFamily="18" charset="0"/>
-                <a:ea typeface="Calibri"/>
-                <a:cs typeface="Times New Roman" pitchFamily="18" charset="0"/>
-                <a:sym typeface="Wingdings" pitchFamily="2" charset="2"/>
-              </a:rPr>
-              <a:t>1</a:t>
-            </a:r>
-            <a:endParaRPr lang="es-ES_tradnl" sz="1600" dirty="0" smtClean="0">
-              <a:latin typeface="Times New Roman" pitchFamily="18" charset="0"/>
-              <a:ea typeface="Calibri"/>
-              <a:cs typeface="Times New Roman" pitchFamily="18" charset="0"/>
-              <a:sym typeface="Wingdings" pitchFamily="2" charset="2"/>
-            </a:endParaRPr>
+              <a:t> 1</a:t>
+            </a:r>
           </a:p>
           <a:p>
             <a:pPr>
@@ -11825,38 +13072,14 @@
               </a:tabLst>
             </a:pPr>
             <a:r>
-              <a:rPr lang="es-ES_tradnl" sz="1600" dirty="0" smtClean="0">
+              <a:rPr lang="es-ES_tradnl" sz="1600" dirty="0">
                 <a:latin typeface="Times New Roman" pitchFamily="18" charset="0"/>
                 <a:ea typeface="Calibri"/>
                 <a:cs typeface="Times New Roman" pitchFamily="18" charset="0"/>
                 <a:sym typeface="Wingdings" pitchFamily="2" charset="2"/>
               </a:rPr>
-              <a:t>VII </a:t>
-            </a:r>
-            <a:r>
-              <a:rPr lang="es-ES_tradnl" sz="1600" dirty="0" smtClean="0">
-                <a:latin typeface="Times New Roman" pitchFamily="18" charset="0"/>
-                <a:ea typeface="Calibri"/>
-                <a:cs typeface="Times New Roman" pitchFamily="18" charset="0"/>
-                <a:sym typeface="Wingdings" pitchFamily="2" charset="2"/>
-              </a:rPr>
-              <a:t> </a:t>
-            </a:r>
-            <a:r>
-              <a:rPr lang="es-ES_tradnl" sz="1600" dirty="0">
-                <a:latin typeface="Times New Roman" pitchFamily="18" charset="0"/>
-                <a:ea typeface="Calibri"/>
-                <a:cs typeface="Times New Roman" pitchFamily="18" charset="0"/>
-                <a:sym typeface="Wingdings" pitchFamily="2" charset="2"/>
-              </a:rPr>
-              <a:t>7</a:t>
-            </a:r>
-            <a:endParaRPr lang="es-ES_tradnl" sz="1600" dirty="0" smtClean="0">
-              <a:latin typeface="Times New Roman" pitchFamily="18" charset="0"/>
-              <a:ea typeface="Calibri"/>
-              <a:cs typeface="Times New Roman" pitchFamily="18" charset="0"/>
-              <a:sym typeface="Wingdings" pitchFamily="2" charset="2"/>
-            </a:endParaRPr>
+              <a:t>VII  7</a:t>
+            </a:r>
           </a:p>
           <a:p>
             <a:pPr>
@@ -11868,38 +13091,14 @@
               </a:tabLst>
             </a:pPr>
             <a:r>
-              <a:rPr lang="es-ES_tradnl" sz="1600" dirty="0" smtClean="0">
+              <a:rPr lang="es-ES_tradnl" sz="1600" dirty="0">
                 <a:latin typeface="Times New Roman" pitchFamily="18" charset="0"/>
                 <a:ea typeface="Calibri"/>
                 <a:cs typeface="Times New Roman" pitchFamily="18" charset="0"/>
                 <a:sym typeface="Wingdings" pitchFamily="2" charset="2"/>
               </a:rPr>
-              <a:t>X </a:t>
-            </a:r>
-            <a:r>
-              <a:rPr lang="es-ES_tradnl" sz="1600" dirty="0" smtClean="0">
-                <a:latin typeface="Times New Roman" pitchFamily="18" charset="0"/>
-                <a:ea typeface="Calibri"/>
-                <a:cs typeface="Times New Roman" pitchFamily="18" charset="0"/>
-                <a:sym typeface="Wingdings" pitchFamily="2" charset="2"/>
-              </a:rPr>
-              <a:t> </a:t>
-            </a:r>
-            <a:r>
-              <a:rPr lang="es-ES_tradnl" sz="1600" dirty="0" smtClean="0">
-                <a:latin typeface="Times New Roman" pitchFamily="18" charset="0"/>
-                <a:ea typeface="Calibri"/>
-                <a:cs typeface="Times New Roman" pitchFamily="18" charset="0"/>
-                <a:sym typeface="Wingdings" pitchFamily="2" charset="2"/>
-              </a:rPr>
-              <a:t>10</a:t>
-            </a:r>
-            <a:endParaRPr lang="es-ES_tradnl" sz="1600" dirty="0" smtClean="0">
-              <a:latin typeface="Times New Roman" pitchFamily="18" charset="0"/>
-              <a:ea typeface="Calibri"/>
-              <a:cs typeface="Times New Roman" pitchFamily="18" charset="0"/>
-              <a:sym typeface="Wingdings" pitchFamily="2" charset="2"/>
-            </a:endParaRPr>
+              <a:t>X  10</a:t>
+            </a:r>
           </a:p>
           <a:p>
             <a:pPr>
@@ -11917,16 +13116,7 @@
                 <a:cs typeface="Times New Roman" pitchFamily="18" charset="0"/>
                 <a:sym typeface="Wingdings" pitchFamily="2" charset="2"/>
               </a:rPr>
-              <a:t>XIV  </a:t>
-            </a:r>
-            <a:r>
-              <a:rPr lang="es-ES_tradnl" sz="1600" dirty="0" smtClean="0">
-                <a:latin typeface="Times New Roman" pitchFamily="18" charset="0"/>
-                <a:ea typeface="Calibri"/>
-                <a:cs typeface="Times New Roman" pitchFamily="18" charset="0"/>
-                <a:sym typeface="Wingdings" pitchFamily="2" charset="2"/>
-              </a:rPr>
-              <a:t>14</a:t>
+              <a:t>XIV  14</a:t>
             </a:r>
             <a:endParaRPr lang="es-ES" sz="1600" dirty="0">
               <a:latin typeface="Times New Roman" pitchFamily="18" charset="0"/>
@@ -11941,642 +13131,6 @@
         <p14:creationId xmlns:p14="http://schemas.microsoft.com/office/powerpoint/2010/main" val="4030544715"/>
       </p:ext>
     </p:extLst>
-  </p:cSld>
-  <p:clrMapOvr>
-    <a:masterClrMapping/>
-  </p:clrMapOvr>
-</p:sld>
-</file>
-
-<file path=ppt/slides/slide9.xml><?xml version="1.0" encoding="utf-8"?>
-<p:sld xmlns:a="http://schemas.openxmlformats.org/drawingml/2006/main" xmlns:r="http://schemas.openxmlformats.org/officeDocument/2006/relationships" xmlns:p="http://schemas.openxmlformats.org/presentationml/2006/main">
-  <p:cSld>
-    <p:spTree>
-      <p:nvGrpSpPr>
-        <p:cNvPr id="1" name="Shape 194"/>
-        <p:cNvGrpSpPr/>
-        <p:nvPr/>
-      </p:nvGrpSpPr>
-      <p:grpSpPr>
-        <a:xfrm>
-          <a:off x="0" y="0"/>
-          <a:ext cx="0" cy="0"/>
-          <a:chOff x="0" y="0"/>
-          <a:chExt cx="0" cy="0"/>
-        </a:xfrm>
-      </p:grpSpPr>
-      <p:sp>
-        <p:nvSpPr>
-          <p:cNvPr id="195" name="Shape 195"/>
-          <p:cNvSpPr txBox="1">
-            <a:spLocks noGrp="1"/>
-          </p:cNvSpPr>
-          <p:nvPr>
-            <p:ph type="title"/>
-          </p:nvPr>
-        </p:nvSpPr>
-        <p:spPr>
-          <a:xfrm>
-            <a:off x="609600" y="274635"/>
-            <a:ext cx="10972800" cy="686800"/>
-          </a:xfrm>
-          <a:prstGeom prst="rect">
-            <a:avLst/>
-          </a:prstGeom>
-          <a:noFill/>
-          <a:ln>
-            <a:noFill/>
-          </a:ln>
-        </p:spPr>
-        <p:txBody>
-          <a:bodyPr vert="horz" lIns="121900" tIns="60933" rIns="121900" bIns="60933" rtlCol="0" anchor="ctr" anchorCtr="0">
-            <a:noAutofit/>
-          </a:bodyPr>
-          <a:lstStyle/>
-          <a:p>
-            <a:pPr lvl="0" algn="l">
-              <a:buSzPct val="25000"/>
-            </a:pPr>
-            <a:r>
-              <a:rPr lang="es" sz="4267" b="1" dirty="0" smtClean="0">
-                <a:solidFill>
-                  <a:srgbClr val="00B0F0"/>
-                </a:solidFill>
-                <a:latin typeface="Times New Roman" panose="02020603050405020304" pitchFamily="18" charset="0"/>
-                <a:cs typeface="Times New Roman" panose="02020603050405020304" pitchFamily="18" charset="0"/>
-              </a:rPr>
-              <a:t>Roman-Decimal </a:t>
-            </a:r>
-            <a:r>
-              <a:rPr lang="es" sz="2667" dirty="0" smtClean="0">
-                <a:solidFill>
-                  <a:srgbClr val="00B0F0"/>
-                </a:solidFill>
-                <a:latin typeface="Times New Roman" panose="02020603050405020304" pitchFamily="18" charset="0"/>
-                <a:cs typeface="Times New Roman" panose="02020603050405020304" pitchFamily="18" charset="0"/>
-              </a:rPr>
-              <a:t>(Reglas)</a:t>
-            </a:r>
-            <a:endParaRPr lang="es" sz="1600" dirty="0">
-              <a:solidFill>
-                <a:srgbClr val="00B0F0"/>
-              </a:solidFill>
-              <a:latin typeface="Times New Roman" panose="02020603050405020304" pitchFamily="18" charset="0"/>
-              <a:cs typeface="Times New Roman" panose="02020603050405020304" pitchFamily="18" charset="0"/>
-            </a:endParaRPr>
-          </a:p>
-        </p:txBody>
-      </p:sp>
-      <p:sp>
-        <p:nvSpPr>
-          <p:cNvPr id="196" name="Shape 196"/>
-          <p:cNvSpPr txBox="1"/>
-          <p:nvPr/>
-        </p:nvSpPr>
-        <p:spPr>
-          <a:xfrm>
-            <a:off x="6121305" y="1124744"/>
-            <a:ext cx="5760640" cy="5040560"/>
-          </a:xfrm>
-          <a:prstGeom prst="rect">
-            <a:avLst/>
-          </a:prstGeom>
-          <a:noFill/>
-          <a:ln>
-            <a:noFill/>
-          </a:ln>
-        </p:spPr>
-        <p:txBody>
-          <a:bodyPr lIns="121900" tIns="60933" rIns="121900" bIns="60933" anchor="t" anchorCtr="0">
-            <a:noAutofit/>
-          </a:bodyPr>
-          <a:lstStyle/>
-          <a:p>
-            <a:pPr algn="just">
-              <a:spcBef>
-                <a:spcPts val="533"/>
-              </a:spcBef>
-              <a:tabLst>
-                <a:tab pos="480472" algn="l"/>
-              </a:tabLst>
-            </a:pPr>
-            <a:endParaRPr lang="es-ES" sz="1600" dirty="0" smtClean="0">
-              <a:latin typeface="Calibri" panose="020F0502020204030204" pitchFamily="34" charset="0"/>
-              <a:ea typeface="Calibri"/>
-              <a:cs typeface="Calibri" panose="020F0502020204030204" pitchFamily="34" charset="0"/>
-              <a:sym typeface="Calibri"/>
-            </a:endParaRPr>
-          </a:p>
-          <a:p>
-            <a:pPr marL="342900" lvl="0" indent="-342900" algn="just">
-              <a:lnSpc>
-                <a:spcPct val="107000"/>
-              </a:lnSpc>
-              <a:spcAft>
-                <a:spcPts val="800"/>
-              </a:spcAft>
-              <a:buSzPts val="1000"/>
-              <a:buFont typeface="Symbol" panose="05050102010706020507" pitchFamily="18" charset="2"/>
-              <a:buChar char=""/>
-              <a:tabLst>
-                <a:tab pos="457200" algn="l"/>
-              </a:tabLst>
-            </a:pPr>
-            <a:r>
-              <a:rPr lang="es-ES" sz="1600" dirty="0">
-                <a:latin typeface="Times New Roman" panose="02020603050405020304" pitchFamily="18" charset="0"/>
-                <a:ea typeface="Calibri" panose="020F0502020204030204" pitchFamily="34" charset="0"/>
-                <a:cs typeface="Times New Roman" panose="02020603050405020304" pitchFamily="18" charset="0"/>
-              </a:rPr>
-              <a:t>Los números romanos siempre se escriben y leen de izquierda a </a:t>
-            </a:r>
-            <a:r>
-              <a:rPr lang="es-ES" sz="1600" dirty="0" smtClean="0">
-                <a:latin typeface="Times New Roman" panose="02020603050405020304" pitchFamily="18" charset="0"/>
-                <a:ea typeface="Calibri" panose="020F0502020204030204" pitchFamily="34" charset="0"/>
-                <a:cs typeface="Times New Roman" panose="02020603050405020304" pitchFamily="18" charset="0"/>
-              </a:rPr>
-              <a:t>derecha, es decir, empezando por los números de mayor valor.</a:t>
-            </a:r>
-          </a:p>
-          <a:p>
-            <a:pPr marL="342900" lvl="0" indent="-342900" algn="just">
-              <a:lnSpc>
-                <a:spcPct val="107000"/>
-              </a:lnSpc>
-              <a:spcAft>
-                <a:spcPts val="800"/>
-              </a:spcAft>
-              <a:buSzPts val="1000"/>
-              <a:buFont typeface="Symbol" panose="05050102010706020507" pitchFamily="18" charset="2"/>
-              <a:buChar char=""/>
-              <a:tabLst>
-                <a:tab pos="457200" algn="l"/>
-              </a:tabLst>
-            </a:pPr>
-            <a:r>
-              <a:rPr lang="es-ES" sz="1600" dirty="0" smtClean="0">
-                <a:latin typeface="Times New Roman" panose="02020603050405020304" pitchFamily="18" charset="0"/>
-                <a:ea typeface="Calibri" panose="020F0502020204030204" pitchFamily="34" charset="0"/>
-                <a:cs typeface="Times New Roman" panose="02020603050405020304" pitchFamily="18" charset="0"/>
-              </a:rPr>
-              <a:t>Los números seguidos de otro de valor igual o menor se suman siempre, como, por ejemplo, XXII que sería 10 + 10 + 1 + 1= 22.</a:t>
-            </a:r>
-          </a:p>
-          <a:p>
-            <a:pPr marL="342900" lvl="0" indent="-342900" algn="just">
-              <a:lnSpc>
-                <a:spcPct val="107000"/>
-              </a:lnSpc>
-              <a:spcAft>
-                <a:spcPts val="800"/>
-              </a:spcAft>
-              <a:buSzPts val="1000"/>
-              <a:buFont typeface="Symbol" panose="05050102010706020507" pitchFamily="18" charset="2"/>
-              <a:buChar char=""/>
-              <a:tabLst>
-                <a:tab pos="457200" algn="l"/>
-              </a:tabLst>
-            </a:pPr>
-            <a:r>
-              <a:rPr lang="es-ES" sz="1600" dirty="0" smtClean="0">
-                <a:latin typeface="Times New Roman" panose="02020603050405020304" pitchFamily="18" charset="0"/>
-                <a:ea typeface="Calibri" panose="020F0502020204030204" pitchFamily="34" charset="0"/>
-                <a:cs typeface="Times New Roman" panose="02020603050405020304" pitchFamily="18" charset="0"/>
-              </a:rPr>
-              <a:t>Los números seguidos de otro de mayor valor se restan siempre, como, por ejemplo, XIX que sería 10 + (1 – 10) = 19.</a:t>
-            </a:r>
-          </a:p>
-          <a:p>
-            <a:pPr marL="342900" lvl="0" indent="-342900" algn="just">
-              <a:lnSpc>
-                <a:spcPct val="107000"/>
-              </a:lnSpc>
-              <a:spcAft>
-                <a:spcPts val="800"/>
-              </a:spcAft>
-              <a:buSzPts val="1000"/>
-              <a:buFont typeface="Symbol" panose="05050102010706020507" pitchFamily="18" charset="2"/>
-              <a:buChar char=""/>
-              <a:tabLst>
-                <a:tab pos="457200" algn="l"/>
-              </a:tabLst>
-            </a:pPr>
-            <a:r>
-              <a:rPr lang="es-ES" sz="1600" dirty="0" smtClean="0">
-                <a:latin typeface="Times New Roman" panose="02020603050405020304" pitchFamily="18" charset="0"/>
-                <a:ea typeface="Calibri" panose="020F0502020204030204" pitchFamily="34" charset="0"/>
-                <a:cs typeface="Times New Roman" panose="02020603050405020304" pitchFamily="18" charset="0"/>
-              </a:rPr>
-              <a:t>El </a:t>
-            </a:r>
-            <a:r>
-              <a:rPr lang="es-ES" sz="1600" dirty="0">
-                <a:latin typeface="Times New Roman" panose="02020603050405020304" pitchFamily="18" charset="0"/>
-                <a:ea typeface="Calibri" panose="020F0502020204030204" pitchFamily="34" charset="0"/>
-                <a:cs typeface="Times New Roman" panose="02020603050405020304" pitchFamily="18" charset="0"/>
-              </a:rPr>
-              <a:t>número I y sus múltiplos X y C, pueden colocarse delante de un número mayor para restar valor, pero sin repetirse. Además, solo pueden restar valor a números inmediatamente superior, pero no a valores mucho más elevados. Es decir, I solo puede restar a V y X, C a L y C, y C a D y M.</a:t>
-            </a:r>
-          </a:p>
-          <a:p>
-            <a:pPr marL="342900" lvl="0" indent="-342900" algn="just">
-              <a:lnSpc>
-                <a:spcPct val="107000"/>
-              </a:lnSpc>
-              <a:spcAft>
-                <a:spcPts val="800"/>
-              </a:spcAft>
-              <a:buSzPts val="1000"/>
-              <a:buFont typeface="Symbol" panose="05050102010706020507" pitchFamily="18" charset="2"/>
-              <a:buChar char=""/>
-              <a:tabLst>
-                <a:tab pos="457200" algn="l"/>
-              </a:tabLst>
-            </a:pPr>
-            <a:r>
-              <a:rPr lang="es-ES" sz="1600" dirty="0">
-                <a:latin typeface="Times New Roman" panose="02020603050405020304" pitchFamily="18" charset="0"/>
-                <a:ea typeface="Calibri" panose="020F0502020204030204" pitchFamily="34" charset="0"/>
-                <a:cs typeface="Times New Roman" panose="02020603050405020304" pitchFamily="18" charset="0"/>
-              </a:rPr>
-              <a:t>El número V y sus múltiplos V y D no se pueden usar para restar en ningún caso. Por ejemplo, el número cuarenta y cinco se escribe XLV y no VL.</a:t>
-            </a:r>
-          </a:p>
-          <a:p>
-            <a:pPr lvl="0" algn="just">
-              <a:lnSpc>
-                <a:spcPct val="107000"/>
-              </a:lnSpc>
-              <a:spcAft>
-                <a:spcPts val="800"/>
-              </a:spcAft>
-              <a:buSzPts val="1000"/>
-              <a:tabLst>
-                <a:tab pos="457200" algn="l"/>
-              </a:tabLst>
-            </a:pPr>
-            <a:endParaRPr lang="es-ES" sz="1600" dirty="0" smtClean="0">
-              <a:latin typeface="Calibri" panose="020F0502020204030204" pitchFamily="34" charset="0"/>
-              <a:ea typeface="Calibri" panose="020F0502020204030204" pitchFamily="34" charset="0"/>
-              <a:cs typeface="Times New Roman" panose="02020603050405020304" pitchFamily="18" charset="0"/>
-            </a:endParaRPr>
-          </a:p>
-          <a:p>
-            <a:pPr marL="342900" lvl="0" indent="-342900" algn="just">
-              <a:lnSpc>
-                <a:spcPct val="107000"/>
-              </a:lnSpc>
-              <a:spcAft>
-                <a:spcPts val="800"/>
-              </a:spcAft>
-              <a:buSzPts val="1000"/>
-              <a:buFont typeface="Symbol" panose="05050102010706020507" pitchFamily="18" charset="2"/>
-              <a:buChar char=""/>
-              <a:tabLst>
-                <a:tab pos="457200" algn="l"/>
-              </a:tabLst>
-            </a:pPr>
-            <a:endParaRPr lang="es-ES" sz="1200" dirty="0" smtClean="0">
-              <a:latin typeface="Calibri" panose="020F0502020204030204" pitchFamily="34" charset="0"/>
-              <a:ea typeface="Calibri" panose="020F0502020204030204" pitchFamily="34" charset="0"/>
-              <a:cs typeface="Calibri" panose="020F0502020204030204" pitchFamily="34" charset="0"/>
-            </a:endParaRPr>
-          </a:p>
-          <a:p>
-            <a:pPr lvl="0" algn="just">
-              <a:lnSpc>
-                <a:spcPct val="107000"/>
-              </a:lnSpc>
-              <a:spcAft>
-                <a:spcPts val="800"/>
-              </a:spcAft>
-              <a:buSzPts val="1000"/>
-              <a:tabLst>
-                <a:tab pos="457200" algn="l"/>
-              </a:tabLst>
-            </a:pPr>
-            <a:endParaRPr lang="es-ES" sz="1600" dirty="0" smtClean="0">
-              <a:latin typeface="Calibri" panose="020F0502020204030204" pitchFamily="34" charset="0"/>
-              <a:ea typeface="Calibri" panose="020F0502020204030204" pitchFamily="34" charset="0"/>
-              <a:cs typeface="Calibri" panose="020F0502020204030204" pitchFamily="34" charset="0"/>
-            </a:endParaRPr>
-          </a:p>
-          <a:p>
-            <a:pPr algn="just">
-              <a:spcBef>
-                <a:spcPts val="533"/>
-              </a:spcBef>
-              <a:tabLst>
-                <a:tab pos="480472" algn="l"/>
-              </a:tabLst>
-            </a:pPr>
-            <a:endParaRPr lang="es-ES" sz="1200" dirty="0" smtClean="0">
-              <a:latin typeface="Calibri"/>
-              <a:ea typeface="Calibri"/>
-              <a:cs typeface="Calibri"/>
-              <a:sym typeface="Calibri"/>
-            </a:endParaRPr>
-          </a:p>
-        </p:txBody>
-      </p:sp>
-      <p:sp>
-        <p:nvSpPr>
-          <p:cNvPr id="3" name="TextBox 2"/>
-          <p:cNvSpPr txBox="1"/>
-          <p:nvPr/>
-        </p:nvSpPr>
-        <p:spPr>
-          <a:xfrm>
-            <a:off x="4295800" y="1336700"/>
-            <a:ext cx="2088232" cy="4616648"/>
-          </a:xfrm>
-          <a:prstGeom prst="rect">
-            <a:avLst/>
-          </a:prstGeom>
-          <a:noFill/>
-        </p:spPr>
-        <p:txBody>
-          <a:bodyPr wrap="square" rtlCol="0">
-            <a:spAutoFit/>
-          </a:bodyPr>
-          <a:lstStyle/>
-          <a:p>
-            <a:pPr>
-              <a:lnSpc>
-                <a:spcPct val="150000"/>
-              </a:lnSpc>
-            </a:pPr>
-            <a:r>
-              <a:rPr lang="es-ES" sz="2800" b="1" dirty="0" smtClean="0">
-                <a:solidFill>
-                  <a:schemeClr val="accent4">
-                    <a:lumMod val="75000"/>
-                  </a:schemeClr>
-                </a:solidFill>
-                <a:latin typeface="Times New Roman" panose="02020603050405020304" pitchFamily="18" charset="0"/>
-                <a:cs typeface="Times New Roman" panose="02020603050405020304" pitchFamily="18" charset="0"/>
-              </a:rPr>
-              <a:t>I</a:t>
-            </a:r>
-            <a:r>
-              <a:rPr lang="es-ES" sz="2800" b="1" dirty="0" smtClean="0">
-                <a:latin typeface="Times New Roman" panose="02020603050405020304" pitchFamily="18" charset="0"/>
-                <a:cs typeface="Times New Roman" panose="02020603050405020304" pitchFamily="18" charset="0"/>
-              </a:rPr>
-              <a:t> </a:t>
-            </a:r>
-            <a:r>
-              <a:rPr lang="es-ES" sz="2800" dirty="0" smtClean="0">
-                <a:latin typeface="Times New Roman" panose="02020603050405020304" pitchFamily="18" charset="0"/>
-                <a:cs typeface="Times New Roman" panose="02020603050405020304" pitchFamily="18" charset="0"/>
-              </a:rPr>
-              <a:t>=</a:t>
-            </a:r>
-            <a:r>
-              <a:rPr lang="es-ES" sz="2800" b="1" dirty="0" smtClean="0">
-                <a:latin typeface="Times New Roman" panose="02020603050405020304" pitchFamily="18" charset="0"/>
-                <a:cs typeface="Times New Roman" panose="02020603050405020304" pitchFamily="18" charset="0"/>
-              </a:rPr>
-              <a:t> </a:t>
-            </a:r>
-            <a:r>
-              <a:rPr lang="es-ES" sz="2800" dirty="0" smtClean="0">
-                <a:latin typeface="Times New Roman" panose="02020603050405020304" pitchFamily="18" charset="0"/>
-                <a:cs typeface="Times New Roman" panose="02020603050405020304" pitchFamily="18" charset="0"/>
-              </a:rPr>
-              <a:t>1</a:t>
-            </a:r>
-          </a:p>
-          <a:p>
-            <a:pPr>
-              <a:lnSpc>
-                <a:spcPct val="150000"/>
-              </a:lnSpc>
-            </a:pPr>
-            <a:r>
-              <a:rPr lang="es-ES" sz="2800" b="1" dirty="0" smtClean="0">
-                <a:solidFill>
-                  <a:schemeClr val="accent4">
-                    <a:lumMod val="75000"/>
-                  </a:schemeClr>
-                </a:solidFill>
-                <a:latin typeface="Times New Roman" panose="02020603050405020304" pitchFamily="18" charset="0"/>
-                <a:cs typeface="Times New Roman" panose="02020603050405020304" pitchFamily="18" charset="0"/>
-              </a:rPr>
-              <a:t>V</a:t>
-            </a:r>
-            <a:r>
-              <a:rPr lang="es-ES" sz="2800" b="1" dirty="0" smtClean="0">
-                <a:latin typeface="Times New Roman" panose="02020603050405020304" pitchFamily="18" charset="0"/>
-                <a:cs typeface="Times New Roman" panose="02020603050405020304" pitchFamily="18" charset="0"/>
-              </a:rPr>
-              <a:t> </a:t>
-            </a:r>
-            <a:r>
-              <a:rPr lang="es-ES" sz="2800" dirty="0" smtClean="0">
-                <a:latin typeface="Times New Roman" panose="02020603050405020304" pitchFamily="18" charset="0"/>
-                <a:cs typeface="Times New Roman" panose="02020603050405020304" pitchFamily="18" charset="0"/>
-              </a:rPr>
-              <a:t>= 5</a:t>
-            </a:r>
-          </a:p>
-          <a:p>
-            <a:pPr>
-              <a:lnSpc>
-                <a:spcPct val="150000"/>
-              </a:lnSpc>
-            </a:pPr>
-            <a:r>
-              <a:rPr lang="es-ES" sz="2800" b="1" dirty="0" smtClean="0">
-                <a:solidFill>
-                  <a:schemeClr val="accent4">
-                    <a:lumMod val="75000"/>
-                  </a:schemeClr>
-                </a:solidFill>
-                <a:latin typeface="Times New Roman" panose="02020603050405020304" pitchFamily="18" charset="0"/>
-                <a:cs typeface="Times New Roman" panose="02020603050405020304" pitchFamily="18" charset="0"/>
-              </a:rPr>
-              <a:t>X</a:t>
-            </a:r>
-            <a:r>
-              <a:rPr lang="es-ES" sz="2800" b="1" dirty="0" smtClean="0">
-                <a:latin typeface="Times New Roman" panose="02020603050405020304" pitchFamily="18" charset="0"/>
-                <a:cs typeface="Times New Roman" panose="02020603050405020304" pitchFamily="18" charset="0"/>
-              </a:rPr>
-              <a:t> </a:t>
-            </a:r>
-            <a:r>
-              <a:rPr lang="es-ES" sz="2800" dirty="0" smtClean="0">
-                <a:latin typeface="Times New Roman" panose="02020603050405020304" pitchFamily="18" charset="0"/>
-                <a:cs typeface="Times New Roman" panose="02020603050405020304" pitchFamily="18" charset="0"/>
-              </a:rPr>
-              <a:t>= 10</a:t>
-            </a:r>
-          </a:p>
-          <a:p>
-            <a:pPr>
-              <a:lnSpc>
-                <a:spcPct val="150000"/>
-              </a:lnSpc>
-            </a:pPr>
-            <a:r>
-              <a:rPr lang="es-ES" sz="2800" b="1" dirty="0" smtClean="0">
-                <a:solidFill>
-                  <a:schemeClr val="accent4">
-                    <a:lumMod val="75000"/>
-                  </a:schemeClr>
-                </a:solidFill>
-                <a:latin typeface="Times New Roman" panose="02020603050405020304" pitchFamily="18" charset="0"/>
-                <a:cs typeface="Times New Roman" panose="02020603050405020304" pitchFamily="18" charset="0"/>
-              </a:rPr>
-              <a:t>L</a:t>
-            </a:r>
-            <a:r>
-              <a:rPr lang="es-ES" sz="2800" b="1" dirty="0" smtClean="0">
-                <a:latin typeface="Times New Roman" panose="02020603050405020304" pitchFamily="18" charset="0"/>
-                <a:cs typeface="Times New Roman" panose="02020603050405020304" pitchFamily="18" charset="0"/>
-              </a:rPr>
-              <a:t> </a:t>
-            </a:r>
-            <a:r>
-              <a:rPr lang="es-ES" sz="2800" dirty="0" smtClean="0">
-                <a:latin typeface="Times New Roman" panose="02020603050405020304" pitchFamily="18" charset="0"/>
-                <a:cs typeface="Times New Roman" panose="02020603050405020304" pitchFamily="18" charset="0"/>
-              </a:rPr>
-              <a:t>= 50</a:t>
-            </a:r>
-          </a:p>
-          <a:p>
-            <a:pPr>
-              <a:lnSpc>
-                <a:spcPct val="150000"/>
-              </a:lnSpc>
-            </a:pPr>
-            <a:r>
-              <a:rPr lang="es-ES" sz="2800" b="1" dirty="0" smtClean="0">
-                <a:solidFill>
-                  <a:schemeClr val="accent4">
-                    <a:lumMod val="75000"/>
-                  </a:schemeClr>
-                </a:solidFill>
-                <a:latin typeface="Times New Roman" panose="02020603050405020304" pitchFamily="18" charset="0"/>
-                <a:cs typeface="Times New Roman" panose="02020603050405020304" pitchFamily="18" charset="0"/>
-              </a:rPr>
-              <a:t>C</a:t>
-            </a:r>
-            <a:r>
-              <a:rPr lang="es-ES" sz="2800" b="1" dirty="0" smtClean="0">
-                <a:latin typeface="Times New Roman" panose="02020603050405020304" pitchFamily="18" charset="0"/>
-                <a:cs typeface="Times New Roman" panose="02020603050405020304" pitchFamily="18" charset="0"/>
-              </a:rPr>
-              <a:t> </a:t>
-            </a:r>
-            <a:r>
-              <a:rPr lang="es-ES" sz="2800" dirty="0" smtClean="0">
-                <a:latin typeface="Times New Roman" panose="02020603050405020304" pitchFamily="18" charset="0"/>
-                <a:cs typeface="Times New Roman" panose="02020603050405020304" pitchFamily="18" charset="0"/>
-              </a:rPr>
-              <a:t>= 100</a:t>
-            </a:r>
-          </a:p>
-          <a:p>
-            <a:pPr>
-              <a:lnSpc>
-                <a:spcPct val="150000"/>
-              </a:lnSpc>
-            </a:pPr>
-            <a:r>
-              <a:rPr lang="es-ES" sz="2800" b="1" dirty="0" smtClean="0">
-                <a:solidFill>
-                  <a:schemeClr val="accent4">
-                    <a:lumMod val="75000"/>
-                  </a:schemeClr>
-                </a:solidFill>
-                <a:latin typeface="Times New Roman" panose="02020603050405020304" pitchFamily="18" charset="0"/>
-                <a:cs typeface="Times New Roman" panose="02020603050405020304" pitchFamily="18" charset="0"/>
-              </a:rPr>
-              <a:t>D</a:t>
-            </a:r>
-            <a:r>
-              <a:rPr lang="es-ES" sz="2800" b="1" dirty="0" smtClean="0">
-                <a:latin typeface="Times New Roman" panose="02020603050405020304" pitchFamily="18" charset="0"/>
-                <a:cs typeface="Times New Roman" panose="02020603050405020304" pitchFamily="18" charset="0"/>
-              </a:rPr>
-              <a:t> </a:t>
-            </a:r>
-            <a:r>
-              <a:rPr lang="es-ES" sz="2800" dirty="0" smtClean="0">
-                <a:latin typeface="Times New Roman" panose="02020603050405020304" pitchFamily="18" charset="0"/>
-                <a:cs typeface="Times New Roman" panose="02020603050405020304" pitchFamily="18" charset="0"/>
-              </a:rPr>
-              <a:t>= 500</a:t>
-            </a:r>
-          </a:p>
-          <a:p>
-            <a:pPr>
-              <a:lnSpc>
-                <a:spcPct val="150000"/>
-              </a:lnSpc>
-            </a:pPr>
-            <a:r>
-              <a:rPr lang="es-ES" sz="2800" b="1" dirty="0" smtClean="0">
-                <a:solidFill>
-                  <a:schemeClr val="accent4">
-                    <a:lumMod val="75000"/>
-                  </a:schemeClr>
-                </a:solidFill>
-                <a:latin typeface="Times New Roman" panose="02020603050405020304" pitchFamily="18" charset="0"/>
-                <a:cs typeface="Times New Roman" panose="02020603050405020304" pitchFamily="18" charset="0"/>
-              </a:rPr>
-              <a:t>M</a:t>
-            </a:r>
-            <a:r>
-              <a:rPr lang="es-ES" sz="2800" b="1" dirty="0" smtClean="0">
-                <a:latin typeface="Times New Roman" panose="02020603050405020304" pitchFamily="18" charset="0"/>
-                <a:cs typeface="Times New Roman" panose="02020603050405020304" pitchFamily="18" charset="0"/>
-              </a:rPr>
-              <a:t> </a:t>
-            </a:r>
-            <a:r>
-              <a:rPr lang="es-ES" sz="2800" dirty="0" smtClean="0">
-                <a:latin typeface="Times New Roman" panose="02020603050405020304" pitchFamily="18" charset="0"/>
-                <a:cs typeface="Times New Roman" panose="02020603050405020304" pitchFamily="18" charset="0"/>
-              </a:rPr>
-              <a:t>= 1000</a:t>
-            </a:r>
-            <a:endParaRPr lang="es-ES" sz="2800" dirty="0">
-              <a:latin typeface="Times New Roman" panose="02020603050405020304" pitchFamily="18" charset="0"/>
-              <a:cs typeface="Times New Roman" panose="02020603050405020304" pitchFamily="18" charset="0"/>
-            </a:endParaRPr>
-          </a:p>
-        </p:txBody>
-      </p:sp>
-      <p:pic>
-        <p:nvPicPr>
-          <p:cNvPr id="6" name="Picture 5"/>
-          <p:cNvPicPr>
-            <a:picLocks noChangeAspect="1"/>
-          </p:cNvPicPr>
-          <p:nvPr/>
-        </p:nvPicPr>
-        <p:blipFill>
-          <a:blip r:embed="rId3"/>
-          <a:stretch>
-            <a:fillRect/>
-          </a:stretch>
-        </p:blipFill>
-        <p:spPr>
-          <a:xfrm>
-            <a:off x="609600" y="1916832"/>
-            <a:ext cx="3456384" cy="3456384"/>
-          </a:xfrm>
-          <a:prstGeom prst="rect">
-            <a:avLst/>
-          </a:prstGeom>
-        </p:spPr>
-      </p:pic>
-    </p:spTree>
   </p:cSld>
   <p:clrMapOvr>
     <a:masterClrMapping/>
@@ -13583,6 +14137,15 @@
 </file>
 
 <file path=customXml/item2.xml><?xml version="1.0" encoding="utf-8"?>
+<?mso-contentType ?>
+<FormTemplates xmlns="http://schemas.microsoft.com/sharepoint/v3/contenttype/forms">
+  <Display>DocumentLibraryForm</Display>
+  <Edit>DocumentLibraryForm</Edit>
+  <New>DocumentLibraryForm</New>
+</FormTemplates>
+</file>
+
+<file path=customXml/item3.xml><?xml version="1.0" encoding="utf-8"?>
 <ct:contentTypeSchema xmlns:ct="http://schemas.microsoft.com/office/2006/metadata/contentType" xmlns:ma="http://schemas.microsoft.com/office/2006/metadata/properties/metaAttributes" ct:_="" ma:_="" ma:contentTypeName="Document" ma:contentTypeID="0x01010003E6AA805E06284B92367B5312DAEABD" ma:contentTypeVersion="2" ma:contentTypeDescription="Create a new document." ma:contentTypeScope="" ma:versionID="5d3fcf7c78f9559156fd4b1bff51d7a0">
   <xsd:schema xmlns:xsd="http://www.w3.org/2001/XMLSchema" xmlns:xs="http://www.w3.org/2001/XMLSchema" xmlns:p="http://schemas.microsoft.com/office/2006/metadata/properties" xmlns:ns2="99b8c997-432e-483c-b625-62aec4b38177" targetNamespace="http://schemas.microsoft.com/office/2006/metadata/properties" ma:root="true" ma:fieldsID="82cee7966e8b05c359a02592ddd1367d" ns2:_="">
     <xsd:import namespace="99b8c997-432e-483c-b625-62aec4b38177"/>
@@ -13714,15 +14277,6 @@
 </ct:contentTypeSchema>
 </file>
 
-<file path=customXml/item3.xml><?xml version="1.0" encoding="utf-8"?>
-<?mso-contentType ?>
-<FormTemplates xmlns="http://schemas.microsoft.com/sharepoint/v3/contenttype/forms">
-  <Display>DocumentLibraryForm</Display>
-  <Edit>DocumentLibraryForm</Edit>
-  <New>DocumentLibraryForm</New>
-</FormTemplates>
-</file>
-
 <file path=customXml/itemProps1.xml><?xml version="1.0" encoding="utf-8"?>
 <ds:datastoreItem xmlns:ds="http://schemas.openxmlformats.org/officeDocument/2006/customXml" ds:itemID="{E6E34656-E680-4E45-821A-28D34D1E6F89}">
   <ds:schemaRefs>
@@ -13733,6 +14287,14 @@
 </file>
 
 <file path=customXml/itemProps2.xml><?xml version="1.0" encoding="utf-8"?>
+<ds:datastoreItem xmlns:ds="http://schemas.openxmlformats.org/officeDocument/2006/customXml" ds:itemID="{A3E109F4-0379-463E-9FBF-BAF009C5FA9B}">
+  <ds:schemaRefs>
+    <ds:schemaRef ds:uri="http://schemas.microsoft.com/sharepoint/v3/contenttype/forms"/>
+  </ds:schemaRefs>
+</ds:datastoreItem>
+</file>
+
+<file path=customXml/itemProps3.xml><?xml version="1.0" encoding="utf-8"?>
 <ds:datastoreItem xmlns:ds="http://schemas.openxmlformats.org/officeDocument/2006/customXml" ds:itemID="{97CBFFC5-6D74-4537-88D6-2718B8B037EF}">
   <ds:schemaRefs>
     <ds:schemaRef ds:uri="http://schemas.microsoft.com/office/2006/metadata/contentType"/>
@@ -13748,12 +14310,4 @@
     <ds:schemaRef ds:uri="http://schemas.microsoft.com/internal/obd"/>
   </ds:schemaRefs>
 </ds:datastoreItem>
-</file>
-
-<file path=customXml/itemProps3.xml><?xml version="1.0" encoding="utf-8"?>
-<ds:datastoreItem xmlns:ds="http://schemas.openxmlformats.org/officeDocument/2006/customXml" ds:itemID="{A3E109F4-0379-463E-9FBF-BAF009C5FA9B}">
-  <ds:schemaRefs>
-    <ds:schemaRef ds:uri="http://schemas.microsoft.com/sharepoint/v3/contenttype/forms"/>
-  </ds:schemaRefs>
-</ds:datastoreItem>
 </file>
</xml_diff>